<commit_message>
Updated slides for episode 1 and 3
</commit_message>
<xml_diff>
--- a/instructors/episode1.pptx
+++ b/instructors/episode1.pptx
@@ -12,7 +12,7 @@
     <p:sldId id="296" r:id="rId6"/>
     <p:sldId id="297" r:id="rId7"/>
     <p:sldId id="724" r:id="rId8"/>
-    <p:sldId id="728" r:id="rId9"/>
+    <p:sldId id="733" r:id="rId9"/>
     <p:sldId id="709" r:id="rId10"/>
     <p:sldId id="285" r:id="rId11"/>
     <p:sldId id="729" r:id="rId12"/>
@@ -32,7 +32,7 @@
       <p:bold r:id="rId21"/>
     </p:embeddedFont>
     <p:embeddedFont>
-      <p:font typeface="Nunito" pitchFamily="2" charset="77"/>
+      <p:font typeface="Nunito" pitchFamily="2" charset="0"/>
       <p:regular r:id="rId22"/>
       <p:bold r:id="rId23"/>
       <p:italic r:id="rId24"/>
@@ -6775,7 +6775,7 @@
             <a:defRPr b="1"/>
           </a:pPr>
           <a:r>
-            <a:rPr lang="en-US" sz="1800">
+            <a:rPr lang="en-US" sz="1800" dirty="0">
               <a:latin typeface="Calibri" panose="020F0502020204030204" pitchFamily="34" charset="0"/>
               <a:cs typeface="Calibri" panose="020F0502020204030204" pitchFamily="34" charset="0"/>
             </a:rPr>
@@ -6819,7 +6819,7 @@
             </a:lnSpc>
           </a:pPr>
           <a:r>
-            <a:rPr lang="en-US" sz="1400">
+            <a:rPr lang="en-US" sz="1400" dirty="0">
               <a:latin typeface="Calibri" panose="020F0502020204030204" pitchFamily="34" charset="0"/>
               <a:cs typeface="Calibri" panose="020F0502020204030204" pitchFamily="34" charset="0"/>
             </a:rPr>
@@ -6864,7 +6864,7 @@
             <a:defRPr b="1"/>
           </a:pPr>
           <a:r>
-            <a:rPr lang="en-US" sz="1800">
+            <a:rPr lang="en-US" sz="1800" dirty="0">
               <a:latin typeface="Calibri" panose="020F0502020204030204" pitchFamily="34" charset="0"/>
               <a:cs typeface="Calibri" panose="020F0502020204030204" pitchFamily="34" charset="0"/>
             </a:rPr>
@@ -6908,7 +6908,7 @@
             </a:lnSpc>
           </a:pPr>
           <a:r>
-            <a:rPr lang="en-US" sz="1400">
+            <a:rPr lang="en-US" sz="1400" dirty="0">
               <a:latin typeface="Calibri" panose="020F0502020204030204" pitchFamily="34" charset="0"/>
               <a:cs typeface="Calibri" panose="020F0502020204030204" pitchFamily="34" charset="0"/>
             </a:rPr>
@@ -6952,7 +6952,7 @@
             </a:lnSpc>
           </a:pPr>
           <a:r>
-            <a:rPr lang="en-US" sz="1400">
+            <a:rPr lang="en-US" sz="1400" dirty="0">
               <a:latin typeface="Calibri" panose="020F0502020204030204" pitchFamily="34" charset="0"/>
               <a:cs typeface="Calibri" panose="020F0502020204030204" pitchFamily="34" charset="0"/>
             </a:rPr>
@@ -6997,7 +6997,7 @@
             <a:defRPr b="1"/>
           </a:pPr>
           <a:r>
-            <a:rPr lang="en-US" sz="1800">
+            <a:rPr lang="en-US" sz="1800" dirty="0">
               <a:latin typeface="Calibri" panose="020F0502020204030204" pitchFamily="34" charset="0"/>
               <a:cs typeface="Calibri" panose="020F0502020204030204" pitchFamily="34" charset="0"/>
             </a:rPr>
@@ -7091,7 +7091,7 @@
             <a:defRPr b="1"/>
           </a:pPr>
           <a:r>
-            <a:rPr lang="en-US" sz="1800">
+            <a:rPr lang="en-US" sz="1800" dirty="0">
               <a:latin typeface="Calibri" panose="020F0502020204030204" pitchFamily="34" charset="0"/>
               <a:cs typeface="Calibri" panose="020F0502020204030204" pitchFamily="34" charset="0"/>
             </a:rPr>
@@ -7135,7 +7135,7 @@
             </a:lnSpc>
           </a:pPr>
           <a:r>
-            <a:rPr lang="en-US" sz="1400">
+            <a:rPr lang="en-US" sz="1400" dirty="0">
               <a:latin typeface="Calibri" panose="020F0502020204030204" pitchFamily="34" charset="0"/>
               <a:cs typeface="Calibri" panose="020F0502020204030204" pitchFamily="34" charset="0"/>
             </a:rPr>
@@ -7179,7 +7179,7 @@
             </a:lnSpc>
           </a:pPr>
           <a:r>
-            <a:rPr lang="en-US" sz="1400">
+            <a:rPr lang="en-US" sz="1400" dirty="0">
               <a:latin typeface="Calibri" panose="020F0502020204030204" pitchFamily="34" charset="0"/>
               <a:cs typeface="Calibri" panose="020F0502020204030204" pitchFamily="34" charset="0"/>
             </a:rPr>
@@ -7224,7 +7224,7 @@
       <dgm:spPr/>
     </dgm:pt>
     <dgm:pt modelId="{67CC4088-01CC-4F87-B76D-CF538113BC4C}" type="pres">
-      <dgm:prSet presAssocID="{4B9822D7-1C84-5F48-92D7-A6442F9B9EAB}" presName="iconRect" presStyleLbl="node1" presStyleIdx="0" presStyleCnt="5"/>
+      <dgm:prSet presAssocID="{4B9822D7-1C84-5F48-92D7-A6442F9B9EAB}" presName="iconRect" presStyleLbl="node1" presStyleIdx="0" presStyleCnt="5" custLinFactNeighborY="-82974"/>
       <dgm:spPr>
         <a:blipFill>
           <a:blip xmlns:r="http://schemas.openxmlformats.org/officeDocument/2006/relationships" r:embed="rId1">
@@ -7253,7 +7253,7 @@
       <dgm:spPr/>
     </dgm:pt>
     <dgm:pt modelId="{E886A513-743F-4C2B-8CD8-8AC484C6CFDC}" type="pres">
-      <dgm:prSet presAssocID="{4B9822D7-1C84-5F48-92D7-A6442F9B9EAB}" presName="parTx" presStyleLbl="revTx" presStyleIdx="0" presStyleCnt="10">
+      <dgm:prSet presAssocID="{4B9822D7-1C84-5F48-92D7-A6442F9B9EAB}" presName="parTx" presStyleLbl="revTx" presStyleIdx="0" presStyleCnt="10" custLinFactNeighborY="-58968">
         <dgm:presLayoutVars>
           <dgm:chMax val="0"/>
           <dgm:chPref val="0"/>
@@ -7266,7 +7266,7 @@
       <dgm:spPr/>
     </dgm:pt>
     <dgm:pt modelId="{1D235EF6-D282-4079-8B0A-32E339C70D7B}" type="pres">
-      <dgm:prSet presAssocID="{4B9822D7-1C84-5F48-92D7-A6442F9B9EAB}" presName="desTx" presStyleLbl="revTx" presStyleIdx="1" presStyleCnt="10">
+      <dgm:prSet presAssocID="{4B9822D7-1C84-5F48-92D7-A6442F9B9EAB}" presName="desTx" presStyleLbl="revTx" presStyleIdx="1" presStyleCnt="10" custScaleX="108707">
         <dgm:presLayoutVars/>
       </dgm:prSet>
       <dgm:spPr/>
@@ -7280,7 +7280,7 @@
       <dgm:spPr/>
     </dgm:pt>
     <dgm:pt modelId="{96E08373-1C4A-45AF-A449-D71132844477}" type="pres">
-      <dgm:prSet presAssocID="{8336CB4C-9102-3045-B480-104A44743821}" presName="iconRect" presStyleLbl="node1" presStyleIdx="1" presStyleCnt="5"/>
+      <dgm:prSet presAssocID="{8336CB4C-9102-3045-B480-104A44743821}" presName="iconRect" presStyleLbl="node1" presStyleIdx="1" presStyleCnt="5" custLinFactNeighborY="-70987"/>
       <dgm:spPr>
         <a:blipFill>
           <a:blip xmlns:r="http://schemas.openxmlformats.org/officeDocument/2006/relationships" r:embed="rId3">
@@ -7309,7 +7309,7 @@
       <dgm:spPr/>
     </dgm:pt>
     <dgm:pt modelId="{3685083C-FFDB-4915-B03C-67E67C96D3DD}" type="pres">
-      <dgm:prSet presAssocID="{8336CB4C-9102-3045-B480-104A44743821}" presName="parTx" presStyleLbl="revTx" presStyleIdx="2" presStyleCnt="10">
+      <dgm:prSet presAssocID="{8336CB4C-9102-3045-B480-104A44743821}" presName="parTx" presStyleLbl="revTx" presStyleIdx="2" presStyleCnt="10" custScaleX="127881" custLinFactNeighborY="-47628">
         <dgm:presLayoutVars>
           <dgm:chMax val="0"/>
           <dgm:chPref val="0"/>
@@ -7322,7 +7322,7 @@
       <dgm:spPr/>
     </dgm:pt>
     <dgm:pt modelId="{B7D0F8C0-133F-4608-8B17-B56F3B87827A}" type="pres">
-      <dgm:prSet presAssocID="{8336CB4C-9102-3045-B480-104A44743821}" presName="desTx" presStyleLbl="revTx" presStyleIdx="3" presStyleCnt="10">
+      <dgm:prSet presAssocID="{8336CB4C-9102-3045-B480-104A44743821}" presName="desTx" presStyleLbl="revTx" presStyleIdx="3" presStyleCnt="10" custLinFactNeighborY="-24820">
         <dgm:presLayoutVars/>
       </dgm:prSet>
       <dgm:spPr/>
@@ -7336,7 +7336,7 @@
       <dgm:spPr/>
     </dgm:pt>
     <dgm:pt modelId="{1E89AD99-026A-4A87-ADC3-79D3C403E84D}" type="pres">
-      <dgm:prSet presAssocID="{E347AB5C-46AA-2645-AB75-55B9FE6EE3D4}" presName="iconRect" presStyleLbl="node1" presStyleIdx="2" presStyleCnt="5"/>
+      <dgm:prSet presAssocID="{E347AB5C-46AA-2645-AB75-55B9FE6EE3D4}" presName="iconRect" presStyleLbl="node1" presStyleIdx="2" presStyleCnt="5" custLinFactNeighborX="-29315" custLinFactNeighborY="-82974"/>
       <dgm:spPr>
         <a:blipFill>
           <a:blip xmlns:r="http://schemas.openxmlformats.org/officeDocument/2006/relationships" r:embed="rId5">
@@ -7365,7 +7365,7 @@
       <dgm:spPr/>
     </dgm:pt>
     <dgm:pt modelId="{376F6AA9-E918-4CB9-BF44-31D807AE9B16}" type="pres">
-      <dgm:prSet presAssocID="{E347AB5C-46AA-2645-AB75-55B9FE6EE3D4}" presName="parTx" presStyleLbl="revTx" presStyleIdx="4" presStyleCnt="10">
+      <dgm:prSet presAssocID="{E347AB5C-46AA-2645-AB75-55B9FE6EE3D4}" presName="parTx" presStyleLbl="revTx" presStyleIdx="4" presStyleCnt="10" custLinFactNeighborX="-7101" custLinFactNeighborY="-58968">
         <dgm:presLayoutVars>
           <dgm:chMax val="0"/>
           <dgm:chPref val="0"/>
@@ -7378,7 +7378,7 @@
       <dgm:spPr/>
     </dgm:pt>
     <dgm:pt modelId="{E6558EF2-743D-470B-A98A-ECD4F1F7D908}" type="pres">
-      <dgm:prSet presAssocID="{E347AB5C-46AA-2645-AB75-55B9FE6EE3D4}" presName="desTx" presStyleLbl="revTx" presStyleIdx="5" presStyleCnt="10">
+      <dgm:prSet presAssocID="{E347AB5C-46AA-2645-AB75-55B9FE6EE3D4}" presName="desTx" presStyleLbl="revTx" presStyleIdx="5" presStyleCnt="10" custScaleX="105856" custLinFactNeighborX="-7890">
         <dgm:presLayoutVars/>
       </dgm:prSet>
       <dgm:spPr/>
@@ -7392,7 +7392,7 @@
       <dgm:spPr/>
     </dgm:pt>
     <dgm:pt modelId="{9157DA12-1B26-4C67-904E-C2C2D6178EDA}" type="pres">
-      <dgm:prSet presAssocID="{B632DCC1-B4B4-8541-A764-2D3878B446C5}" presName="iconRect" presStyleLbl="node1" presStyleIdx="3" presStyleCnt="5"/>
+      <dgm:prSet presAssocID="{B632DCC1-B4B4-8541-A764-2D3878B446C5}" presName="iconRect" presStyleLbl="node1" presStyleIdx="3" presStyleCnt="5" custLinFactNeighborY="-82974"/>
       <dgm:spPr>
         <a:blipFill>
           <a:blip xmlns:r="http://schemas.openxmlformats.org/officeDocument/2006/relationships" r:embed="rId7">
@@ -7421,7 +7421,7 @@
       <dgm:spPr/>
     </dgm:pt>
     <dgm:pt modelId="{A083170F-9BEA-46A4-950D-FA3AE25938B6}" type="pres">
-      <dgm:prSet presAssocID="{B632DCC1-B4B4-8541-A764-2D3878B446C5}" presName="parTx" presStyleLbl="revTx" presStyleIdx="6" presStyleCnt="10">
+      <dgm:prSet presAssocID="{B632DCC1-B4B4-8541-A764-2D3878B446C5}" presName="parTx" presStyleLbl="revTx" presStyleIdx="6" presStyleCnt="10" custLinFactNeighborX="-7890" custLinFactNeighborY="-58968">
         <dgm:presLayoutVars>
           <dgm:chMax val="0"/>
           <dgm:chPref val="0"/>
@@ -7434,7 +7434,7 @@
       <dgm:spPr/>
     </dgm:pt>
     <dgm:pt modelId="{5ED19775-98C3-4F8B-9969-4CFD5B4DD569}" type="pres">
-      <dgm:prSet presAssocID="{B632DCC1-B4B4-8541-A764-2D3878B446C5}" presName="desTx" presStyleLbl="revTx" presStyleIdx="7" presStyleCnt="10">
+      <dgm:prSet presAssocID="{B632DCC1-B4B4-8541-A764-2D3878B446C5}" presName="desTx" presStyleLbl="revTx" presStyleIdx="7" presStyleCnt="10" custScaleX="108711" custLinFactNeighborX="-5523">
         <dgm:presLayoutVars/>
       </dgm:prSet>
       <dgm:spPr/>
@@ -7448,7 +7448,7 @@
       <dgm:spPr/>
     </dgm:pt>
     <dgm:pt modelId="{E6852A16-25DA-4EBF-B3DD-E3736AB1E81A}" type="pres">
-      <dgm:prSet presAssocID="{A28C5443-3A33-CE45-9057-EA56059A0327}" presName="iconRect" presStyleLbl="node1" presStyleIdx="4" presStyleCnt="5"/>
+      <dgm:prSet presAssocID="{A28C5443-3A33-CE45-9057-EA56059A0327}" presName="iconRect" presStyleLbl="node1" presStyleIdx="4" presStyleCnt="5" custLinFactNeighborY="-82974"/>
       <dgm:spPr>
         <a:blipFill>
           <a:blip xmlns:r="http://schemas.openxmlformats.org/officeDocument/2006/relationships" r:embed="rId9">
@@ -7477,7 +7477,7 @@
       <dgm:spPr/>
     </dgm:pt>
     <dgm:pt modelId="{8B867BB5-1C09-4BD4-83E4-A9BDB0303E71}" type="pres">
-      <dgm:prSet presAssocID="{A28C5443-3A33-CE45-9057-EA56059A0327}" presName="parTx" presStyleLbl="revTx" presStyleIdx="8" presStyleCnt="10">
+      <dgm:prSet presAssocID="{A28C5443-3A33-CE45-9057-EA56059A0327}" presName="parTx" presStyleLbl="revTx" presStyleIdx="8" presStyleCnt="10" custLinFactNeighborY="-58968">
         <dgm:presLayoutVars>
           <dgm:chMax val="0"/>
           <dgm:chPref val="0"/>
@@ -7490,7 +7490,7 @@
       <dgm:spPr/>
     </dgm:pt>
     <dgm:pt modelId="{4FC5D0EC-96EA-480D-A97F-FEB1E472A670}" type="pres">
-      <dgm:prSet presAssocID="{A28C5443-3A33-CE45-9057-EA56059A0327}" presName="desTx" presStyleLbl="revTx" presStyleIdx="9" presStyleCnt="10">
+      <dgm:prSet presAssocID="{A28C5443-3A33-CE45-9057-EA56059A0327}" presName="desTx" presStyleLbl="revTx" presStyleIdx="9" presStyleCnt="10" custScaleX="105323">
         <dgm:presLayoutVars/>
       </dgm:prSet>
       <dgm:spPr/>
@@ -7508,11 +7508,11 @@
     <dgm:cxn modelId="{78A39439-93C1-E445-A334-502EE3BA6A4E}" srcId="{0ED6EFD2-4598-E24E-B50D-A8A8A8686A94}" destId="{E347AB5C-46AA-2645-AB75-55B9FE6EE3D4}" srcOrd="2" destOrd="0" parTransId="{F1CAE4F2-2D0D-3A42-AC24-49464E4DBD40}" sibTransId="{948FA2D4-9C0B-414E-BFED-A8F5659EFFA3}"/>
     <dgm:cxn modelId="{13744D3E-C82F-BF4A-88E3-7DB109C6E721}" srcId="{0ED6EFD2-4598-E24E-B50D-A8A8A8686A94}" destId="{B632DCC1-B4B4-8541-A764-2D3878B446C5}" srcOrd="3" destOrd="0" parTransId="{C1F10BDB-9A8F-9445-A5B7-E01F4B6837F9}" sibTransId="{803DD168-02F8-184F-943C-BBB6C28BCEE5}"/>
     <dgm:cxn modelId="{85646D3F-0941-7A48-956E-3087CA823417}" srcId="{B632DCC1-B4B4-8541-A764-2D3878B446C5}" destId="{C0044FB9-707C-7C46-8AF6-DA939F47CD27}" srcOrd="0" destOrd="0" parTransId="{1230C8EB-B39F-BF4B-8A20-2C636A1D104A}" sibTransId="{1AC93607-4C9A-5F4F-B7A7-2A2B798FC50F}"/>
+    <dgm:cxn modelId="{7D550462-0AD3-8F42-A38A-6690B51E4C71}" srcId="{A28C5443-3A33-CE45-9057-EA56059A0327}" destId="{6F5641B1-9837-8541-A091-567ED6A6C58E}" srcOrd="0" destOrd="0" parTransId="{D9B747F6-2D24-7540-BD22-5B0E69302020}" sibTransId="{1791B5CD-6F7C-DE44-9AB2-8F424058E92C}"/>
     <dgm:cxn modelId="{7D8E144A-0FF7-4E19-848B-92242473FC84}" type="presOf" srcId="{A28C5443-3A33-CE45-9057-EA56059A0327}" destId="{8B867BB5-1C09-4BD4-83E4-A9BDB0303E71}" srcOrd="0" destOrd="0" presId="urn:microsoft.com/office/officeart/2018/5/layout/CenteredIconLabelDescriptionList"/>
     <dgm:cxn modelId="{00E0254B-0E48-42DA-9163-FDAE7981DC13}" type="presOf" srcId="{1B4F0E61-340A-B247-9306-74D84C5D6B80}" destId="{1D235EF6-D282-4079-8B0A-32E339C70D7B}" srcOrd="0" destOrd="0" presId="urn:microsoft.com/office/officeart/2018/5/layout/CenteredIconLabelDescriptionList"/>
+    <dgm:cxn modelId="{8C360372-F852-7347-BDB8-B3384854410F}" srcId="{8336CB4C-9102-3045-B480-104A44743821}" destId="{4DCAC79D-5986-8745-9B4D-D2711B431D67}" srcOrd="0" destOrd="0" parTransId="{818D4528-95D2-684B-8E39-C8E420155471}" sibTransId="{CB0399AD-CCA9-0B46-AAE6-0CF9D9EDB1CB}"/>
     <dgm:cxn modelId="{92670652-9318-4A3E-82C4-9F5B2CD252B7}" type="presOf" srcId="{6F5641B1-9837-8541-A091-567ED6A6C58E}" destId="{4FC5D0EC-96EA-480D-A97F-FEB1E472A670}" srcOrd="0" destOrd="0" presId="urn:microsoft.com/office/officeart/2018/5/layout/CenteredIconLabelDescriptionList"/>
-    <dgm:cxn modelId="{7D550462-0AD3-8F42-A38A-6690B51E4C71}" srcId="{A28C5443-3A33-CE45-9057-EA56059A0327}" destId="{6F5641B1-9837-8541-A091-567ED6A6C58E}" srcOrd="0" destOrd="0" parTransId="{D9B747F6-2D24-7540-BD22-5B0E69302020}" sibTransId="{1791B5CD-6F7C-DE44-9AB2-8F424058E92C}"/>
-    <dgm:cxn modelId="{8C360372-F852-7347-BDB8-B3384854410F}" srcId="{8336CB4C-9102-3045-B480-104A44743821}" destId="{4DCAC79D-5986-8745-9B4D-D2711B431D67}" srcOrd="0" destOrd="0" parTransId="{818D4528-95D2-684B-8E39-C8E420155471}" sibTransId="{CB0399AD-CCA9-0B46-AAE6-0CF9D9EDB1CB}"/>
     <dgm:cxn modelId="{1062AB74-DC23-43FF-9E58-7E2A962C6EE1}" type="presOf" srcId="{4B9822D7-1C84-5F48-92D7-A6442F9B9EAB}" destId="{E886A513-743F-4C2B-8CD8-8AC484C6CFDC}" srcOrd="0" destOrd="0" presId="urn:microsoft.com/office/officeart/2018/5/layout/CenteredIconLabelDescriptionList"/>
     <dgm:cxn modelId="{DA7BF99F-D697-466C-9E8D-D6376E0DA938}" type="presOf" srcId="{4761B27F-AAB6-7D45-9BF2-F9477253D510}" destId="{E6558EF2-743D-470B-A98A-ECD4F1F7D908}" srcOrd="0" destOrd="0" presId="urn:microsoft.com/office/officeart/2018/5/layout/CenteredIconLabelDescriptionList"/>
     <dgm:cxn modelId="{BE51A5E1-812F-4F2D-A14D-9980FB6A0B73}" type="presOf" srcId="{B632DCC1-B4B4-8541-A764-2D3878B446C5}" destId="{A083170F-9BEA-46A4-950D-FA3AE25938B6}" srcOrd="0" destOrd="0" presId="urn:microsoft.com/office/officeart/2018/5/layout/CenteredIconLabelDescriptionList"/>
@@ -7557,7 +7557,7 @@
   <dgm:whole/>
   <dgm:extLst>
     <a:ext uri="http://schemas.microsoft.com/office/drawing/2008/diagram">
-      <dsp:dataModelExt xmlns:dsp="http://schemas.microsoft.com/office/drawing/2008/diagram" relId="rId8" minVer="http://schemas.openxmlformats.org/drawingml/2006/diagram"/>
+      <dsp:dataModelExt xmlns:dsp="http://schemas.microsoft.com/office/drawing/2008/diagram" relId="rId9" minVer="http://schemas.openxmlformats.org/drawingml/2006/diagram"/>
     </a:ext>
   </dgm:extLst>
 </dgm:dataModel>
@@ -8519,10 +8519,10 @@
     <dgm:cxn modelId="{EB789342-090C-4069-80A8-1794D8DDF3FE}" type="presOf" srcId="{A5E7FD1B-A9BD-414A-8099-A73D2595F70E}" destId="{5F0B069C-61C9-4490-9CDB-74FA3481605D}" srcOrd="0" destOrd="0" presId="urn:microsoft.com/office/officeart/2018/2/layout/IconVerticalSolidList"/>
     <dgm:cxn modelId="{F29EE04C-2473-4F66-9036-7B4968F67DD4}" type="presOf" srcId="{A74E4CEA-3A41-44FC-B081-71515EFE58A9}" destId="{2C409872-03AF-42F7-84A3-EC239F1A83F2}" srcOrd="0" destOrd="0" presId="urn:microsoft.com/office/officeart/2018/2/layout/IconVerticalSolidList"/>
     <dgm:cxn modelId="{C75AB94E-C390-470D-9BE7-19D17C5556C6}" srcId="{A5E7FD1B-A9BD-414A-8099-A73D2595F70E}" destId="{3360E4EE-16E6-4650-A833-21C0D922E484}" srcOrd="0" destOrd="0" parTransId="{FC1A0AA8-F295-4B5D-93F0-DA512A8C4C26}" sibTransId="{9BD86D60-F01D-4199-8F3D-205279E81ACF}"/>
+    <dgm:cxn modelId="{A666FF6E-C102-491D-A0F6-EE2DF7E84E4F}" srcId="{71062276-BFBC-4CE3-9A3E-8DA68F2E660D}" destId="{3D04D131-F4D0-488F-897F-80FA08050156}" srcOrd="0" destOrd="0" parTransId="{D8678A23-4FEC-420D-9B65-0AB00C783958}" sibTransId="{820C6305-5E21-4130-B1AA-67B301D7EC55}"/>
     <dgm:cxn modelId="{D2DDF14F-FDAB-411F-83D2-E3573B92517A}" srcId="{7E68D7CE-87F4-4D0C-A8BE-A081A300D85B}" destId="{293D8ECB-55CF-40FD-BBAD-FDC8BDA149D7}" srcOrd="0" destOrd="0" parTransId="{A6FA3680-380E-4358-8578-80270CF0F049}" sibTransId="{14C7177D-1514-461E-80B1-257C1813A495}"/>
+    <dgm:cxn modelId="{92EF4574-BD11-48A0-8FF1-833689ADBA27}" type="presOf" srcId="{3D04D131-F4D0-488F-897F-80FA08050156}" destId="{FBB8BB48-B4B7-4548-8025-DBCF0F025849}" srcOrd="0" destOrd="0" presId="urn:microsoft.com/office/officeart/2018/2/layout/IconVerticalSolidList"/>
     <dgm:cxn modelId="{0F129354-7987-465B-A810-E535C3249260}" srcId="{464C4350-4E20-48D4-9D31-E1977ABBE5CC}" destId="{9A0F4F89-39FF-4A1D-A6E1-C74DC4167BAD}" srcOrd="2" destOrd="0" parTransId="{715A3B60-0A2D-48C4-9588-8F3A944F99EB}" sibTransId="{EADC1BA3-C2E4-4EC3-9FDC-E4B61844557F}"/>
-    <dgm:cxn modelId="{A666FF6E-C102-491D-A0F6-EE2DF7E84E4F}" srcId="{71062276-BFBC-4CE3-9A3E-8DA68F2E660D}" destId="{3D04D131-F4D0-488F-897F-80FA08050156}" srcOrd="0" destOrd="0" parTransId="{D8678A23-4FEC-420D-9B65-0AB00C783958}" sibTransId="{820C6305-5E21-4130-B1AA-67B301D7EC55}"/>
-    <dgm:cxn modelId="{92EF4574-BD11-48A0-8FF1-833689ADBA27}" type="presOf" srcId="{3D04D131-F4D0-488F-897F-80FA08050156}" destId="{FBB8BB48-B4B7-4548-8025-DBCF0F025849}" srcOrd="0" destOrd="0" presId="urn:microsoft.com/office/officeart/2018/2/layout/IconVerticalSolidList"/>
     <dgm:cxn modelId="{BD96A579-4E47-41D9-BE0A-A31FDE8125C2}" type="presOf" srcId="{71062276-BFBC-4CE3-9A3E-8DA68F2E660D}" destId="{CB4051C6-D6A6-4BE5-BB6A-9BE39CA39B60}" srcOrd="0" destOrd="0" presId="urn:microsoft.com/office/officeart/2018/2/layout/IconVerticalSolidList"/>
     <dgm:cxn modelId="{E8A4857B-3932-48AE-836B-B3782143828A}" srcId="{464C4350-4E20-48D4-9D31-E1977ABBE5CC}" destId="{A74E4CEA-3A41-44FC-B081-71515EFE58A9}" srcOrd="5" destOrd="0" parTransId="{D0A52983-B4BF-4012-962A-ADC2355DC7C9}" sibTransId="{08BFC1CC-5835-4D68-B749-FF73C057F45E}"/>
     <dgm:cxn modelId="{B8685C80-2E3E-409F-BFF2-73E3E4A196C0}" srcId="{8FF808A4-143B-4A49-9934-B493B027CFB4}" destId="{2005E8BB-CA9B-4060-B7C9-BB433CD8B472}" srcOrd="0" destOrd="0" parTransId="{6A759EC6-0A99-4D4C-A814-CD7C937AF4EC}" sibTransId="{5987145B-BB48-4E6E-986A-067165401CC4}"/>
@@ -9025,8 +9025,8 @@
     <dgm:cxn modelId="{AC99D22E-0A09-4833-A043-29541B4A4CA2}" type="presOf" srcId="{0BFE7424-D436-4A38-8D12-FDE0EF2FAACE}" destId="{6AB4D3DA-83D3-4392-A940-7D01C923B521}" srcOrd="1" destOrd="1" presId="urn:microsoft.com/office/officeart/2005/8/layout/vProcess5"/>
     <dgm:cxn modelId="{58B8383E-A7E2-4C47-AC3B-2F31562DAE42}" type="presOf" srcId="{EF242AB5-98E1-45BE-9CE3-9E50083C0825}" destId="{7A50A3D0-0819-4691-83A8-4E45BF1D2ED9}" srcOrd="0" destOrd="1" presId="urn:microsoft.com/office/officeart/2005/8/layout/vProcess5"/>
     <dgm:cxn modelId="{D2B68F41-8B63-4C32-989D-F4EC588BC765}" srcId="{0A9DCDB2-AEB4-4761-B557-49F2656C6864}" destId="{FC5AF68F-6095-4772-BA1F-C39262699F1E}" srcOrd="0" destOrd="0" parTransId="{BE1AD2A9-14A2-4E06-8E33-765D8CEF0C66}" sibTransId="{33F10AAD-8269-45EC-9E46-9D8709128B2B}"/>
+    <dgm:cxn modelId="{D96D1F69-42E0-4624-AC0B-0D6D7502DD07}" srcId="{0A9DCDB2-AEB4-4761-B557-49F2656C6864}" destId="{48412E3B-DA3A-4BCE-88D6-DFB7356FDFC8}" srcOrd="2" destOrd="0" parTransId="{A1CC1F12-E600-4F90-980E-6EBD750795BA}" sibTransId="{159C78DA-1A47-40F3-AD48-4DB9B40164E2}"/>
     <dgm:cxn modelId="{D9E61D4B-695F-4681-834C-FB6C730FC492}" type="presOf" srcId="{4852D90E-5C1B-45DB-BC7E-223F78902158}" destId="{D449460A-96DF-44BB-9791-836D5F5A3B31}" srcOrd="0" destOrd="1" presId="urn:microsoft.com/office/officeart/2005/8/layout/vProcess5"/>
-    <dgm:cxn modelId="{D96D1F69-42E0-4624-AC0B-0D6D7502DD07}" srcId="{0A9DCDB2-AEB4-4761-B557-49F2656C6864}" destId="{48412E3B-DA3A-4BCE-88D6-DFB7356FDFC8}" srcOrd="2" destOrd="0" parTransId="{A1CC1F12-E600-4F90-980E-6EBD750795BA}" sibTransId="{159C78DA-1A47-40F3-AD48-4DB9B40164E2}"/>
     <dgm:cxn modelId="{242F1C70-92E9-4167-8EE2-765A78B2D686}" srcId="{6B01028E-2AC8-48D2-99D9-02055B3B8C27}" destId="{4852D90E-5C1B-45DB-BC7E-223F78902158}" srcOrd="0" destOrd="0" parTransId="{C2C88624-17F1-42DA-802D-0D50C3670183}" sibTransId="{7F34F688-482E-4C8B-8914-AB401E443F7A}"/>
     <dgm:cxn modelId="{E75CAD70-F8A4-460C-8ED7-7C4F8F226A74}" srcId="{0A9DCDB2-AEB4-4761-B557-49F2656C6864}" destId="{6B01028E-2AC8-48D2-99D9-02055B3B8C27}" srcOrd="1" destOrd="0" parTransId="{41AB190A-666B-45A5-9082-FFE7B866AB6E}" sibTransId="{25AF845F-690F-45BA-9A7A-8E5FCA1D1096}"/>
     <dgm:cxn modelId="{CA8F0372-D9FE-4D19-BB2D-CC42F2A5ADBE}" type="presOf" srcId="{25AF845F-690F-45BA-9A7A-8E5FCA1D1096}" destId="{267F10A5-4AE9-4CE2-9F28-0106ED48B525}" srcOrd="0" destOrd="0" presId="urn:microsoft.com/office/officeart/2005/8/layout/vProcess5"/>
@@ -10383,8 +10383,8 @@
       </dsp:nvSpPr>
       <dsp:spPr>
         <a:xfrm>
-          <a:off x="530808" y="149992"/>
-          <a:ext cx="568476" cy="568476"/>
+          <a:off x="594794" y="393711"/>
+          <a:ext cx="558333" cy="558333"/>
         </a:xfrm>
         <a:prstGeom prst="rect">
           <a:avLst/>
@@ -10440,8 +10440,8 @@
       </dsp:nvSpPr>
       <dsp:spPr>
         <a:xfrm>
-          <a:off x="2937" y="863490"/>
-          <a:ext cx="1624218" cy="845101"/>
+          <a:off x="76342" y="1156177"/>
+          <a:ext cx="1595237" cy="559970"/>
         </a:xfrm>
         <a:prstGeom prst="rect">
           <a:avLst/>
@@ -10484,7 +10484,7 @@
             <a:defRPr b="1"/>
           </a:pPr>
           <a:r>
-            <a:rPr lang="en-US" sz="1800" kern="1200">
+            <a:rPr lang="en-US" sz="1800" kern="1200" dirty="0">
               <a:latin typeface="Calibri" panose="020F0502020204030204" pitchFamily="34" charset="0"/>
               <a:cs typeface="Calibri" panose="020F0502020204030204" pitchFamily="34" charset="0"/>
             </a:rPr>
@@ -10493,8 +10493,8 @@
         </a:p>
       </dsp:txBody>
       <dsp:txXfrm>
-        <a:off x="2937" y="863490"/>
-        <a:ext cx="1624218" cy="845101"/>
+        <a:off x="76342" y="1156177"/>
+        <a:ext cx="1595237" cy="559970"/>
       </dsp:txXfrm>
     </dsp:sp>
     <dsp:sp modelId="{1D235EF6-D282-4079-8B0A-32E339C70D7B}">
@@ -10504,8 +10504,8 @@
       </dsp:nvSpPr>
       <dsp:spPr>
         <a:xfrm>
-          <a:off x="2937" y="1776044"/>
-          <a:ext cx="1624218" cy="1746553"/>
+          <a:off x="6893" y="1773446"/>
+          <a:ext cx="1734134" cy="1042160"/>
         </a:xfrm>
         <a:prstGeom prst="rect">
           <a:avLst/>
@@ -10547,7 +10547,7 @@
             <a:buNone/>
           </a:pPr>
           <a:r>
-            <a:rPr lang="en-US" sz="1400" kern="1200">
+            <a:rPr lang="en-US" sz="1400" kern="1200" dirty="0">
               <a:latin typeface="Calibri" panose="020F0502020204030204" pitchFamily="34" charset="0"/>
               <a:cs typeface="Calibri" panose="020F0502020204030204" pitchFamily="34" charset="0"/>
             </a:rPr>
@@ -10556,8 +10556,8 @@
         </a:p>
       </dsp:txBody>
       <dsp:txXfrm>
-        <a:off x="2937" y="1776044"/>
-        <a:ext cx="1624218" cy="1746553"/>
+        <a:off x="6893" y="1773446"/>
+        <a:ext cx="1734134" cy="1042160"/>
       </dsp:txXfrm>
     </dsp:sp>
     <dsp:sp modelId="{96E08373-1C4A-45AF-A449-D71132844477}">
@@ -10567,8 +10567,8 @@
       </dsp:nvSpPr>
       <dsp:spPr>
         <a:xfrm>
-          <a:off x="2439265" y="149992"/>
-          <a:ext cx="568476" cy="568476"/>
+          <a:off x="2761031" y="393710"/>
+          <a:ext cx="558333" cy="558333"/>
         </a:xfrm>
         <a:prstGeom prst="rect">
           <a:avLst/>
@@ -10624,8 +10624,8 @@
       </dsp:nvSpPr>
       <dsp:spPr>
         <a:xfrm>
-          <a:off x="1911394" y="863490"/>
-          <a:ext cx="1624218" cy="845101"/>
+          <a:off x="2020195" y="1152749"/>
+          <a:ext cx="2040005" cy="559970"/>
         </a:xfrm>
         <a:prstGeom prst="rect">
           <a:avLst/>
@@ -10668,7 +10668,7 @@
             <a:defRPr b="1"/>
           </a:pPr>
           <a:r>
-            <a:rPr lang="en-US" sz="1800" kern="1200">
+            <a:rPr lang="en-US" sz="1800" kern="1200" dirty="0">
               <a:latin typeface="Calibri" panose="020F0502020204030204" pitchFamily="34" charset="0"/>
               <a:cs typeface="Calibri" panose="020F0502020204030204" pitchFamily="34" charset="0"/>
             </a:rPr>
@@ -10677,8 +10677,8 @@
         </a:p>
       </dsp:txBody>
       <dsp:txXfrm>
-        <a:off x="1911394" y="863490"/>
-        <a:ext cx="1624218" cy="845101"/>
+        <a:off x="2020195" y="1152749"/>
+        <a:ext cx="2040005" cy="559970"/>
       </dsp:txXfrm>
     </dsp:sp>
     <dsp:sp modelId="{B7D0F8C0-133F-4608-8B17-B56F3B87827A}">
@@ -10688,8 +10688,8 @@
       </dsp:nvSpPr>
       <dsp:spPr>
         <a:xfrm>
-          <a:off x="1911394" y="1776044"/>
-          <a:ext cx="1624218" cy="1746553"/>
+          <a:off x="2242579" y="1796527"/>
+          <a:ext cx="1595237" cy="870059"/>
         </a:xfrm>
         <a:prstGeom prst="rect">
           <a:avLst/>
@@ -10731,7 +10731,7 @@
             <a:buNone/>
           </a:pPr>
           <a:r>
-            <a:rPr lang="en-US" sz="1400" kern="1200">
+            <a:rPr lang="en-US" sz="1400" kern="1200" dirty="0">
               <a:latin typeface="Calibri" panose="020F0502020204030204" pitchFamily="34" charset="0"/>
               <a:cs typeface="Calibri" panose="020F0502020204030204" pitchFamily="34" charset="0"/>
             </a:rPr>
@@ -10740,8 +10740,8 @@
         </a:p>
       </dsp:txBody>
       <dsp:txXfrm>
-        <a:off x="1911394" y="1776044"/>
-        <a:ext cx="1624218" cy="1746553"/>
+        <a:off x="2242579" y="1796527"/>
+        <a:ext cx="1595237" cy="870059"/>
       </dsp:txXfrm>
     </dsp:sp>
     <dsp:sp modelId="{1E89AD99-026A-4A87-ADC3-79D3C403E84D}">
@@ -10751,8 +10751,8 @@
       </dsp:nvSpPr>
       <dsp:spPr>
         <a:xfrm>
-          <a:off x="4347722" y="149992"/>
-          <a:ext cx="568476" cy="568476"/>
+          <a:off x="4740853" y="393711"/>
+          <a:ext cx="558333" cy="558333"/>
         </a:xfrm>
         <a:prstGeom prst="rect">
           <a:avLst/>
@@ -10808,8 +10808,8 @@
       </dsp:nvSpPr>
       <dsp:spPr>
         <a:xfrm>
-          <a:off x="3819851" y="863490"/>
-          <a:ext cx="1624218" cy="845101"/>
+          <a:off x="4272798" y="1156177"/>
+          <a:ext cx="1595237" cy="559970"/>
         </a:xfrm>
         <a:prstGeom prst="rect">
           <a:avLst/>
@@ -10852,7 +10852,7 @@
             <a:defRPr b="1"/>
           </a:pPr>
           <a:r>
-            <a:rPr lang="en-US" sz="1800" kern="1200">
+            <a:rPr lang="en-US" sz="1800" kern="1200" dirty="0">
               <a:latin typeface="Calibri" panose="020F0502020204030204" pitchFamily="34" charset="0"/>
               <a:cs typeface="Calibri" panose="020F0502020204030204" pitchFamily="34" charset="0"/>
             </a:rPr>
@@ -10861,8 +10861,8 @@
         </a:p>
       </dsp:txBody>
       <dsp:txXfrm>
-        <a:off x="3819851" y="863490"/>
-        <a:ext cx="1624218" cy="845101"/>
+        <a:off x="4272798" y="1156177"/>
+        <a:ext cx="1595237" cy="559970"/>
       </dsp:txXfrm>
     </dsp:sp>
     <dsp:sp modelId="{E6558EF2-743D-470B-A98A-ECD4F1F7D908}">
@@ -10872,8 +10872,8 @@
       </dsp:nvSpPr>
       <dsp:spPr>
         <a:xfrm>
-          <a:off x="3819851" y="1776044"/>
-          <a:ext cx="1624218" cy="1746553"/>
+          <a:off x="4213503" y="1773446"/>
+          <a:ext cx="1688654" cy="1042160"/>
         </a:xfrm>
         <a:prstGeom prst="rect">
           <a:avLst/>
@@ -10915,7 +10915,7 @@
             <a:buNone/>
           </a:pPr>
           <a:r>
-            <a:rPr lang="en-US" sz="1400" kern="1200">
+            <a:rPr lang="en-US" sz="1400" kern="1200" dirty="0">
               <a:latin typeface="Calibri" panose="020F0502020204030204" pitchFamily="34" charset="0"/>
               <a:cs typeface="Calibri" panose="020F0502020204030204" pitchFamily="34" charset="0"/>
             </a:rPr>
@@ -10924,8 +10924,8 @@
         </a:p>
       </dsp:txBody>
       <dsp:txXfrm>
-        <a:off x="3819851" y="1776044"/>
-        <a:ext cx="1624218" cy="1746553"/>
+        <a:off x="4213503" y="1773446"/>
+        <a:ext cx="1688654" cy="1042160"/>
       </dsp:txXfrm>
     </dsp:sp>
     <dsp:sp modelId="{9157DA12-1B26-4C67-904E-C2C2D6178EDA}">
@@ -10935,8 +10935,8 @@
       </dsp:nvSpPr>
       <dsp:spPr>
         <a:xfrm>
-          <a:off x="6256179" y="149992"/>
-          <a:ext cx="568476" cy="568476"/>
+          <a:off x="6895121" y="393711"/>
+          <a:ext cx="558333" cy="558333"/>
         </a:xfrm>
         <a:prstGeom prst="rect">
           <a:avLst/>
@@ -10992,8 +10992,8 @@
       </dsp:nvSpPr>
       <dsp:spPr>
         <a:xfrm>
-          <a:off x="5728308" y="863490"/>
-          <a:ext cx="1624218" cy="845101"/>
+          <a:off x="6250805" y="1156177"/>
+          <a:ext cx="1595237" cy="559970"/>
         </a:xfrm>
         <a:prstGeom prst="rect">
           <a:avLst/>
@@ -11036,7 +11036,7 @@
             <a:defRPr b="1"/>
           </a:pPr>
           <a:r>
-            <a:rPr lang="en-US" sz="1800" kern="1200">
+            <a:rPr lang="en-US" sz="1800" kern="1200" dirty="0">
               <a:latin typeface="Calibri" panose="020F0502020204030204" pitchFamily="34" charset="0"/>
               <a:cs typeface="Calibri" panose="020F0502020204030204" pitchFamily="34" charset="0"/>
             </a:rPr>
@@ -11045,8 +11045,8 @@
         </a:p>
       </dsp:txBody>
       <dsp:txXfrm>
-        <a:off x="5728308" y="863490"/>
-        <a:ext cx="1624218" cy="845101"/>
+        <a:off x="6250805" y="1156177"/>
+        <a:ext cx="1595237" cy="559970"/>
       </dsp:txXfrm>
     </dsp:sp>
     <dsp:sp modelId="{5ED19775-98C3-4F8B-9969-4CFD5B4DD569}">
@@ -11056,8 +11056,8 @@
       </dsp:nvSpPr>
       <dsp:spPr>
         <a:xfrm>
-          <a:off x="5728308" y="1776044"/>
-          <a:ext cx="1624218" cy="1746553"/>
+          <a:off x="6219083" y="1773446"/>
+          <a:ext cx="1734198" cy="1042160"/>
         </a:xfrm>
         <a:prstGeom prst="rect">
           <a:avLst/>
@@ -11099,7 +11099,7 @@
             <a:buNone/>
           </a:pPr>
           <a:r>
-            <a:rPr lang="en-US" sz="1400" kern="1200">
+            <a:rPr lang="en-US" sz="1400" kern="1200" dirty="0">
               <a:latin typeface="Calibri" panose="020F0502020204030204" pitchFamily="34" charset="0"/>
               <a:cs typeface="Calibri" panose="020F0502020204030204" pitchFamily="34" charset="0"/>
             </a:rPr>
@@ -11108,8 +11108,8 @@
         </a:p>
       </dsp:txBody>
       <dsp:txXfrm>
-        <a:off x="5728308" y="1776044"/>
-        <a:ext cx="1624218" cy="1746553"/>
+        <a:off x="6219083" y="1773446"/>
+        <a:ext cx="1734198" cy="1042160"/>
       </dsp:txXfrm>
     </dsp:sp>
     <dsp:sp modelId="{E6852A16-25DA-4EBF-B3DD-E3736AB1E81A}">
@@ -11119,8 +11119,8 @@
       </dsp:nvSpPr>
       <dsp:spPr>
         <a:xfrm>
-          <a:off x="8164636" y="149992"/>
-          <a:ext cx="568476" cy="568476"/>
+          <a:off x="8881463" y="393711"/>
+          <a:ext cx="558333" cy="558333"/>
         </a:xfrm>
         <a:prstGeom prst="rect">
           <a:avLst/>
@@ -11176,8 +11176,8 @@
       </dsp:nvSpPr>
       <dsp:spPr>
         <a:xfrm>
-          <a:off x="7636765" y="863490"/>
-          <a:ext cx="1624218" cy="845101"/>
+          <a:off x="8363011" y="1156177"/>
+          <a:ext cx="1595237" cy="559970"/>
         </a:xfrm>
         <a:prstGeom prst="rect">
           <a:avLst/>
@@ -11233,8 +11233,8 @@
         </a:p>
       </dsp:txBody>
       <dsp:txXfrm>
-        <a:off x="7636765" y="863490"/>
-        <a:ext cx="1624218" cy="845101"/>
+        <a:off x="8363011" y="1156177"/>
+        <a:ext cx="1595237" cy="559970"/>
       </dsp:txXfrm>
     </dsp:sp>
     <dsp:sp modelId="{4FC5D0EC-96EA-480D-A97F-FEB1E472A670}">
@@ -11244,8 +11244,8 @@
       </dsp:nvSpPr>
       <dsp:spPr>
         <a:xfrm>
-          <a:off x="7636765" y="1776044"/>
-          <a:ext cx="1624218" cy="1746553"/>
+          <a:off x="8320554" y="1773446"/>
+          <a:ext cx="1680151" cy="1042160"/>
         </a:xfrm>
         <a:prstGeom prst="rect">
           <a:avLst/>
@@ -11287,7 +11287,7 @@
             <a:buNone/>
           </a:pPr>
           <a:r>
-            <a:rPr lang="en-US" sz="1400" kern="1200">
+            <a:rPr lang="en-US" sz="1400" kern="1200" dirty="0">
               <a:latin typeface="Calibri" panose="020F0502020204030204" pitchFamily="34" charset="0"/>
               <a:cs typeface="Calibri" panose="020F0502020204030204" pitchFamily="34" charset="0"/>
             </a:rPr>
@@ -11296,8 +11296,8 @@
         </a:p>
       </dsp:txBody>
       <dsp:txXfrm>
-        <a:off x="7636765" y="1776044"/>
-        <a:ext cx="1624218" cy="1746553"/>
+        <a:off x="8320554" y="1773446"/>
+        <a:ext cx="1680151" cy="1042160"/>
       </dsp:txXfrm>
     </dsp:sp>
   </dsp:spTree>
@@ -12746,7 +12746,7 @@
       <dsp:spPr>
         <a:xfrm>
           <a:off x="0" y="0"/>
-          <a:ext cx="7485380" cy="1173479"/>
+          <a:ext cx="7485380" cy="1173480"/>
         </a:xfrm>
         <a:prstGeom prst="roundRect">
           <a:avLst>
@@ -12835,7 +12835,7 @@
       </dsp:txBody>
       <dsp:txXfrm>
         <a:off x="34370" y="34370"/>
-        <a:ext cx="6119944" cy="1104739"/>
+        <a:ext cx="6119944" cy="1104740"/>
       </dsp:txXfrm>
     </dsp:sp>
     <dsp:sp modelId="{D449460A-96DF-44BB-9791-836D5F5A3B31}">
@@ -12846,7 +12846,7 @@
       <dsp:spPr>
         <a:xfrm>
           <a:off x="626900" y="1386840"/>
-          <a:ext cx="7485380" cy="1173479"/>
+          <a:ext cx="7485380" cy="1173480"/>
         </a:xfrm>
         <a:prstGeom prst="roundRect">
           <a:avLst>
@@ -12935,7 +12935,7 @@
       </dsp:txBody>
       <dsp:txXfrm>
         <a:off x="661270" y="1421210"/>
-        <a:ext cx="6026977" cy="1104740"/>
+        <a:ext cx="6026977" cy="1104739"/>
       </dsp:txXfrm>
     </dsp:sp>
     <dsp:sp modelId="{C09CA668-4F8C-4E7E-896D-EE4A04426F7B}">
@@ -12946,7 +12946,7 @@
       <dsp:spPr>
         <a:xfrm>
           <a:off x="1244444" y="2773680"/>
-          <a:ext cx="7485380" cy="1173479"/>
+          <a:ext cx="7485380" cy="1173480"/>
         </a:xfrm>
         <a:prstGeom prst="roundRect">
           <a:avLst>
@@ -13046,7 +13046,7 @@
       <dsp:spPr>
         <a:xfrm>
           <a:off x="1871345" y="4160520"/>
-          <a:ext cx="7485380" cy="1173479"/>
+          <a:ext cx="7485380" cy="1173480"/>
         </a:xfrm>
         <a:prstGeom prst="roundRect">
           <a:avLst>
@@ -13225,7 +13225,7 @@
       </dsp:nvSpPr>
       <dsp:spPr>
         <a:xfrm>
-          <a:off x="7349518" y="2285619"/>
+          <a:off x="7349518" y="2285618"/>
           <a:ext cx="762762" cy="762762"/>
         </a:xfrm>
         <a:prstGeom prst="downArrow">
@@ -13294,7 +13294,7 @@
         </a:p>
       </dsp:txBody>
       <dsp:txXfrm>
-        <a:off x="7521139" y="2285619"/>
+        <a:off x="7521139" y="2285618"/>
         <a:ext cx="419520" cy="573978"/>
       </dsp:txXfrm>
     </dsp:sp>
@@ -13305,7 +13305,7 @@
       </dsp:nvSpPr>
       <dsp:spPr>
         <a:xfrm>
-          <a:off x="7967062" y="3672458"/>
+          <a:off x="7967062" y="3672459"/>
           <a:ext cx="762762" cy="762762"/>
         </a:xfrm>
         <a:prstGeom prst="downArrow">
@@ -13374,7 +13374,7 @@
         </a:p>
       </dsp:txBody>
       <dsp:txXfrm>
-        <a:off x="8138683" y="3672458"/>
+        <a:off x="8138683" y="3672459"/>
         <a:ext cx="419520" cy="573978"/>
       </dsp:txXfrm>
     </dsp:sp>
@@ -24292,7 +24292,7 @@
           <a:p>
             <a:fld id="{066D4F2D-BEE5-FB44-9A96-ED5266A67716}" type="datetimeFigureOut">
               <a:rPr lang="en-NL" smtClean="0"/>
-              <a:t>22/11/2024</a:t>
+              <a:t>11/22/2024</a:t>
             </a:fld>
             <a:endParaRPr lang="en-NL"/>
           </a:p>
@@ -24647,6 +24647,90 @@
 </p:notes>
 </file>
 
+<file path=ppt/notesSlides/notesSlide10.xml><?xml version="1.0" encoding="utf-8"?>
+<p:notes xmlns:a="http://schemas.openxmlformats.org/drawingml/2006/main" xmlns:r="http://schemas.openxmlformats.org/officeDocument/2006/relationships" xmlns:p="http://schemas.openxmlformats.org/presentationml/2006/main">
+  <p:cSld>
+    <p:spTree>
+      <p:nvGrpSpPr>
+        <p:cNvPr id="1" name=""/>
+        <p:cNvGrpSpPr/>
+        <p:nvPr/>
+      </p:nvGrpSpPr>
+      <p:grpSpPr>
+        <a:xfrm>
+          <a:off x="0" y="0"/>
+          <a:ext cx="0" cy="0"/>
+          <a:chOff x="0" y="0"/>
+          <a:chExt cx="0" cy="0"/>
+        </a:xfrm>
+      </p:grpSpPr>
+      <p:sp>
+        <p:nvSpPr>
+          <p:cNvPr id="2" name="Slide Image Placeholder 1"/>
+          <p:cNvSpPr>
+            <a:spLocks noGrp="1" noRot="1" noChangeAspect="1"/>
+          </p:cNvSpPr>
+          <p:nvPr>
+            <p:ph type="sldImg"/>
+          </p:nvPr>
+        </p:nvSpPr>
+        <p:spPr/>
+      </p:sp>
+      <p:sp>
+        <p:nvSpPr>
+          <p:cNvPr id="3" name="Notes Placeholder 2"/>
+          <p:cNvSpPr>
+            <a:spLocks noGrp="1"/>
+          </p:cNvSpPr>
+          <p:nvPr>
+            <p:ph type="body" idx="1"/>
+          </p:nvPr>
+        </p:nvSpPr>
+        <p:spPr/>
+        <p:txBody>
+          <a:bodyPr/>
+          <a:lstStyle/>
+          <a:p>
+            <a:endParaRPr lang="en-US" dirty="0"/>
+          </a:p>
+        </p:txBody>
+      </p:sp>
+      <p:sp>
+        <p:nvSpPr>
+          <p:cNvPr id="4" name="Slide Number Placeholder 3"/>
+          <p:cNvSpPr>
+            <a:spLocks noGrp="1"/>
+          </p:cNvSpPr>
+          <p:nvPr>
+            <p:ph type="sldNum" sz="quarter" idx="5"/>
+          </p:nvPr>
+        </p:nvSpPr>
+        <p:spPr/>
+        <p:txBody>
+          <a:bodyPr/>
+          <a:lstStyle/>
+          <a:p>
+            <a:fld id="{06A0CF5B-C663-264F-AFCB-2A8BE296B50B}" type="slidenum">
+              <a:rPr lang="en-NL" smtClean="0"/>
+              <a:t>14</a:t>
+            </a:fld>
+            <a:endParaRPr lang="en-NL"/>
+          </a:p>
+        </p:txBody>
+      </p:sp>
+    </p:spTree>
+    <p:extLst>
+      <p:ext uri="{BB962C8B-B14F-4D97-AF65-F5344CB8AC3E}">
+        <p14:creationId xmlns:p14="http://schemas.microsoft.com/office/powerpoint/2010/main" val="3679416614"/>
+      </p:ext>
+    </p:extLst>
+  </p:cSld>
+  <p:clrMapOvr>
+    <a:masterClrMapping/>
+  </p:clrMapOvr>
+</p:notes>
+</file>
+
 <file path=ppt/notesSlides/notesSlide2.xml><?xml version="1.0" encoding="utf-8"?>
 <p:notes xmlns:a="http://schemas.openxmlformats.org/drawingml/2006/main" xmlns:r="http://schemas.openxmlformats.org/officeDocument/2006/relationships" xmlns:p="http://schemas.openxmlformats.org/presentationml/2006/main">
   <p:cSld>
@@ -24820,6 +24904,90 @@
   <p:cSld>
     <p:spTree>
       <p:nvGrpSpPr>
+        <p:cNvPr id="1" name=""/>
+        <p:cNvGrpSpPr/>
+        <p:nvPr/>
+      </p:nvGrpSpPr>
+      <p:grpSpPr>
+        <a:xfrm>
+          <a:off x="0" y="0"/>
+          <a:ext cx="0" cy="0"/>
+          <a:chOff x="0" y="0"/>
+          <a:chExt cx="0" cy="0"/>
+        </a:xfrm>
+      </p:grpSpPr>
+      <p:sp>
+        <p:nvSpPr>
+          <p:cNvPr id="2" name="Slide Image Placeholder 1"/>
+          <p:cNvSpPr>
+            <a:spLocks noGrp="1" noRot="1" noChangeAspect="1"/>
+          </p:cNvSpPr>
+          <p:nvPr>
+            <p:ph type="sldImg"/>
+          </p:nvPr>
+        </p:nvSpPr>
+        <p:spPr/>
+      </p:sp>
+      <p:sp>
+        <p:nvSpPr>
+          <p:cNvPr id="3" name="Notes Placeholder 2"/>
+          <p:cNvSpPr>
+            <a:spLocks noGrp="1"/>
+          </p:cNvSpPr>
+          <p:nvPr>
+            <p:ph type="body" idx="1"/>
+          </p:nvPr>
+        </p:nvSpPr>
+        <p:spPr/>
+        <p:txBody>
+          <a:bodyPr/>
+          <a:lstStyle/>
+          <a:p>
+            <a:endParaRPr lang="en-GB" dirty="0"/>
+          </a:p>
+        </p:txBody>
+      </p:sp>
+      <p:sp>
+        <p:nvSpPr>
+          <p:cNvPr id="4" name="Slide Number Placeholder 3"/>
+          <p:cNvSpPr>
+            <a:spLocks noGrp="1"/>
+          </p:cNvSpPr>
+          <p:nvPr>
+            <p:ph type="sldNum" sz="quarter" idx="5"/>
+          </p:nvPr>
+        </p:nvSpPr>
+        <p:spPr/>
+        <p:txBody>
+          <a:bodyPr/>
+          <a:lstStyle/>
+          <a:p>
+            <a:fld id="{06A0CF5B-C663-264F-AFCB-2A8BE296B50B}" type="slidenum">
+              <a:rPr lang="en-NL" smtClean="0"/>
+              <a:t>5</a:t>
+            </a:fld>
+            <a:endParaRPr lang="en-NL"/>
+          </a:p>
+        </p:txBody>
+      </p:sp>
+    </p:spTree>
+    <p:extLst>
+      <p:ext uri="{BB962C8B-B14F-4D97-AF65-F5344CB8AC3E}">
+        <p14:creationId xmlns:p14="http://schemas.microsoft.com/office/powerpoint/2010/main" val="761906972"/>
+      </p:ext>
+    </p:extLst>
+  </p:cSld>
+  <p:clrMapOvr>
+    <a:masterClrMapping/>
+  </p:clrMapOvr>
+</p:notes>
+</file>
+
+<file path=ppt/notesSlides/notesSlide5.xml><?xml version="1.0" encoding="utf-8"?>
+<p:notes xmlns:a="http://schemas.openxmlformats.org/drawingml/2006/main" xmlns:r="http://schemas.openxmlformats.org/officeDocument/2006/relationships" xmlns:p="http://schemas.openxmlformats.org/presentationml/2006/main">
+  <p:cSld>
+    <p:spTree>
+      <p:nvGrpSpPr>
         <p:cNvPr id="1" name="">
           <a:extLst>
             <a:ext uri="{FF2B5EF4-FFF2-40B4-BE49-F238E27FC236}">
@@ -24980,7 +25148,7 @@
 </p:notes>
 </file>
 
-<file path=ppt/notesSlides/notesSlide5.xml><?xml version="1.0" encoding="utf-8"?>
+<file path=ppt/notesSlides/notesSlide6.xml><?xml version="1.0" encoding="utf-8"?>
 <p:notes xmlns:a="http://schemas.openxmlformats.org/drawingml/2006/main" xmlns:r="http://schemas.openxmlformats.org/officeDocument/2006/relationships" xmlns:p="http://schemas.openxmlformats.org/presentationml/2006/main">
   <p:cSld>
     <p:spTree>
@@ -25261,7 +25429,7 @@
 </p:notes>
 </file>
 
-<file path=ppt/notesSlides/notesSlide6.xml><?xml version="1.0" encoding="utf-8"?>
+<file path=ppt/notesSlides/notesSlide7.xml><?xml version="1.0" encoding="utf-8"?>
 <p:notes xmlns:a="http://schemas.openxmlformats.org/drawingml/2006/main" xmlns:r="http://schemas.openxmlformats.org/officeDocument/2006/relationships" xmlns:p="http://schemas.openxmlformats.org/presentationml/2006/main">
   <p:cSld>
     <p:spTree>
@@ -25345,7 +25513,7 @@
 </p:notes>
 </file>
 
-<file path=ppt/notesSlides/notesSlide7.xml><?xml version="1.0" encoding="utf-8"?>
+<file path=ppt/notesSlides/notesSlide8.xml><?xml version="1.0" encoding="utf-8"?>
 <p:notes xmlns:a="http://schemas.openxmlformats.org/drawingml/2006/main" xmlns:r="http://schemas.openxmlformats.org/officeDocument/2006/relationships" xmlns:p="http://schemas.openxmlformats.org/presentationml/2006/main">
   <p:cSld>
     <p:spTree>
@@ -25546,7 +25714,7 @@
 </p:notes>
 </file>
 
-<file path=ppt/notesSlides/notesSlide8.xml><?xml version="1.0" encoding="utf-8"?>
+<file path=ppt/notesSlides/notesSlide9.xml><?xml version="1.0" encoding="utf-8"?>
 <p:notes xmlns:a="http://schemas.openxmlformats.org/drawingml/2006/main" xmlns:r="http://schemas.openxmlformats.org/officeDocument/2006/relationships" xmlns:p="http://schemas.openxmlformats.org/presentationml/2006/main">
   <p:cSld>
     <p:spTree>
@@ -25797,90 +25965,6 @@
 </p:notes>
 </file>
 
-<file path=ppt/notesSlides/notesSlide9.xml><?xml version="1.0" encoding="utf-8"?>
-<p:notes xmlns:a="http://schemas.openxmlformats.org/drawingml/2006/main" xmlns:r="http://schemas.openxmlformats.org/officeDocument/2006/relationships" xmlns:p="http://schemas.openxmlformats.org/presentationml/2006/main">
-  <p:cSld>
-    <p:spTree>
-      <p:nvGrpSpPr>
-        <p:cNvPr id="1" name=""/>
-        <p:cNvGrpSpPr/>
-        <p:nvPr/>
-      </p:nvGrpSpPr>
-      <p:grpSpPr>
-        <a:xfrm>
-          <a:off x="0" y="0"/>
-          <a:ext cx="0" cy="0"/>
-          <a:chOff x="0" y="0"/>
-          <a:chExt cx="0" cy="0"/>
-        </a:xfrm>
-      </p:grpSpPr>
-      <p:sp>
-        <p:nvSpPr>
-          <p:cNvPr id="2" name="Slide Image Placeholder 1"/>
-          <p:cNvSpPr>
-            <a:spLocks noGrp="1" noRot="1" noChangeAspect="1"/>
-          </p:cNvSpPr>
-          <p:nvPr>
-            <p:ph type="sldImg"/>
-          </p:nvPr>
-        </p:nvSpPr>
-        <p:spPr/>
-      </p:sp>
-      <p:sp>
-        <p:nvSpPr>
-          <p:cNvPr id="3" name="Notes Placeholder 2"/>
-          <p:cNvSpPr>
-            <a:spLocks noGrp="1"/>
-          </p:cNvSpPr>
-          <p:nvPr>
-            <p:ph type="body" idx="1"/>
-          </p:nvPr>
-        </p:nvSpPr>
-        <p:spPr/>
-        <p:txBody>
-          <a:bodyPr/>
-          <a:lstStyle/>
-          <a:p>
-            <a:endParaRPr lang="en-US" dirty="0"/>
-          </a:p>
-        </p:txBody>
-      </p:sp>
-      <p:sp>
-        <p:nvSpPr>
-          <p:cNvPr id="4" name="Slide Number Placeholder 3"/>
-          <p:cNvSpPr>
-            <a:spLocks noGrp="1"/>
-          </p:cNvSpPr>
-          <p:nvPr>
-            <p:ph type="sldNum" sz="quarter" idx="5"/>
-          </p:nvPr>
-        </p:nvSpPr>
-        <p:spPr/>
-        <p:txBody>
-          <a:bodyPr/>
-          <a:lstStyle/>
-          <a:p>
-            <a:fld id="{06A0CF5B-C663-264F-AFCB-2A8BE296B50B}" type="slidenum">
-              <a:rPr lang="en-NL" smtClean="0"/>
-              <a:t>14</a:t>
-            </a:fld>
-            <a:endParaRPr lang="en-NL"/>
-          </a:p>
-        </p:txBody>
-      </p:sp>
-    </p:spTree>
-    <p:extLst>
-      <p:ext uri="{BB962C8B-B14F-4D97-AF65-F5344CB8AC3E}">
-        <p14:creationId xmlns:p14="http://schemas.microsoft.com/office/powerpoint/2010/main" val="3679416614"/>
-      </p:ext>
-    </p:extLst>
-  </p:cSld>
-  <p:clrMapOvr>
-    <a:masterClrMapping/>
-  </p:clrMapOvr>
-</p:notes>
-</file>
-
 <file path=ppt/slideLayouts/slideLayout1.xml><?xml version="1.0" encoding="utf-8"?>
 <p:sldLayout xmlns:a="http://schemas.openxmlformats.org/drawingml/2006/main" xmlns:r="http://schemas.openxmlformats.org/officeDocument/2006/relationships" xmlns:p="http://schemas.openxmlformats.org/presentationml/2006/main" type="title" preserve="1">
   <p:cSld name="Title Slide">
@@ -26046,7 +26130,7 @@
           <a:p>
             <a:fld id="{EA730EFB-AB28-4A68-9CF2-24FEA7CF3D98}" type="datetimeFigureOut">
               <a:rPr lang="en-US" smtClean="0"/>
-              <a:t>11/22/24</a:t>
+              <a:t>11/22/2024</a:t>
             </a:fld>
             <a:endParaRPr lang="en-US"/>
           </a:p>
@@ -26258,7 +26342,7 @@
           <a:p>
             <a:fld id="{EA730EFB-AB28-4A68-9CF2-24FEA7CF3D98}" type="datetimeFigureOut">
               <a:rPr lang="en-US" smtClean="0"/>
-              <a:t>11/22/24</a:t>
+              <a:t>11/22/2024</a:t>
             </a:fld>
             <a:endParaRPr lang="en-US"/>
           </a:p>
@@ -26496,7 +26580,7 @@
           <a:p>
             <a:fld id="{EA730EFB-AB28-4A68-9CF2-24FEA7CF3D98}" type="datetimeFigureOut">
               <a:rPr lang="en-US" smtClean="0"/>
-              <a:t>11/22/24</a:t>
+              <a:t>11/22/2024</a:t>
             </a:fld>
             <a:endParaRPr lang="en-US"/>
           </a:p>
@@ -26727,7 +26811,7 @@
           <a:p>
             <a:fld id="{EA730EFB-AB28-4A68-9CF2-24FEA7CF3D98}" type="datetimeFigureOut">
               <a:rPr lang="en-US" smtClean="0"/>
-              <a:t>11/22/24</a:t>
+              <a:t>11/22/2024</a:t>
             </a:fld>
             <a:endParaRPr lang="en-US"/>
           </a:p>
@@ -27148,7 +27232,7 @@
           <a:p>
             <a:fld id="{EA730EFB-AB28-4A68-9CF2-24FEA7CF3D98}" type="datetimeFigureOut">
               <a:rPr lang="en-US" smtClean="0"/>
-              <a:t>11/22/24</a:t>
+              <a:t>11/22/2024</a:t>
             </a:fld>
             <a:endParaRPr lang="en-US"/>
           </a:p>
@@ -27348,7 +27432,7 @@
           <a:p>
             <a:fld id="{EA730EFB-AB28-4A68-9CF2-24FEA7CF3D98}" type="datetimeFigureOut">
               <a:rPr lang="en-US" smtClean="0"/>
-              <a:t>11/22/24</a:t>
+              <a:t>11/22/2024</a:t>
             </a:fld>
             <a:endParaRPr lang="en-US"/>
           </a:p>
@@ -27818,7 +27902,7 @@
           <a:p>
             <a:fld id="{EA730EFB-AB28-4A68-9CF2-24FEA7CF3D98}" type="datetimeFigureOut">
               <a:rPr lang="en-US" smtClean="0"/>
-              <a:t>11/22/24</a:t>
+              <a:t>11/22/2024</a:t>
             </a:fld>
             <a:endParaRPr lang="en-US"/>
           </a:p>
@@ -28056,7 +28140,7 @@
           <a:p>
             <a:fld id="{EA730EFB-AB28-4A68-9CF2-24FEA7CF3D98}" type="datetimeFigureOut">
               <a:rPr lang="en-US" smtClean="0"/>
-              <a:t>11/22/24</a:t>
+              <a:t>11/22/2024</a:t>
             </a:fld>
             <a:endParaRPr lang="en-US"/>
           </a:p>
@@ -28362,7 +28446,7 @@
           <a:p>
             <a:fld id="{EA730EFB-AB28-4A68-9CF2-24FEA7CF3D98}" type="datetimeFigureOut">
               <a:rPr lang="en-US" smtClean="0"/>
-              <a:t>11/22/24</a:t>
+              <a:t>11/22/2024</a:t>
             </a:fld>
             <a:endParaRPr lang="en-US"/>
           </a:p>
@@ -28649,7 +28733,7 @@
           <a:p>
             <a:fld id="{EA730EFB-AB28-4A68-9CF2-24FEA7CF3D98}" type="datetimeFigureOut">
               <a:rPr lang="en-US" smtClean="0"/>
-              <a:t>11/22/24</a:t>
+              <a:t>11/22/2024</a:t>
             </a:fld>
             <a:endParaRPr lang="en-US"/>
           </a:p>
@@ -28861,7 +28945,7 @@
           <a:p>
             <a:fld id="{EA730EFB-AB28-4A68-9CF2-24FEA7CF3D98}" type="datetimeFigureOut">
               <a:rPr lang="en-US" smtClean="0"/>
-              <a:t>11/22/24</a:t>
+              <a:t>11/22/2024</a:t>
             </a:fld>
             <a:endParaRPr lang="en-US"/>
           </a:p>
@@ -29073,7 +29157,7 @@
           <a:p>
             <a:fld id="{EA730EFB-AB28-4A68-9CF2-24FEA7CF3D98}" type="datetimeFigureOut">
               <a:rPr lang="en-US" smtClean="0"/>
-              <a:t>11/22/24</a:t>
+              <a:t>11/22/2024</a:t>
             </a:fld>
             <a:endParaRPr lang="en-US"/>
           </a:p>
@@ -29279,7 +29363,7 @@
           <a:p>
             <a:fld id="{EA730EFB-AB28-4A68-9CF2-24FEA7CF3D98}" type="datetimeFigureOut">
               <a:rPr lang="en-US" smtClean="0"/>
-              <a:t>11/22/24</a:t>
+              <a:t>11/22/2024</a:t>
             </a:fld>
             <a:endParaRPr lang="en-US"/>
           </a:p>
@@ -29491,7 +29575,7 @@
           <a:p>
             <a:fld id="{EA730EFB-AB28-4A68-9CF2-24FEA7CF3D98}" type="datetimeFigureOut">
               <a:rPr lang="en-US" smtClean="0"/>
-              <a:t>11/22/24</a:t>
+              <a:t>11/22/2024</a:t>
             </a:fld>
             <a:endParaRPr lang="en-US"/>
           </a:p>
@@ -29741,7 +29825,7 @@
           <a:p>
             <a:fld id="{EA730EFB-AB28-4A68-9CF2-24FEA7CF3D98}" type="datetimeFigureOut">
               <a:rPr lang="en-US" smtClean="0"/>
-              <a:t>11/22/24</a:t>
+              <a:t>11/22/2024</a:t>
             </a:fld>
             <a:endParaRPr lang="en-US"/>
           </a:p>
@@ -30604,14 +30688,14 @@
           <p:nvPr>
             <p:extLst>
               <p:ext uri="{D42A27DB-BD31-4B8C-83A1-F6EECF244321}">
-                <p14:modId xmlns:p14="http://schemas.microsoft.com/office/powerpoint/2010/main" val="2500229212"/>
+                <p14:modId xmlns:p14="http://schemas.microsoft.com/office/powerpoint/2010/main" val="2463906835"/>
               </p:ext>
             </p:extLst>
           </p:nvPr>
         </p:nvGraphicFramePr>
         <p:xfrm>
-          <a:off x="1982716" y="983166"/>
-          <a:ext cx="8967527" cy="5394960"/>
+          <a:off x="1204982" y="741866"/>
+          <a:ext cx="10464799" cy="5821680"/>
         </p:xfrm>
         <a:graphic>
           <a:graphicData uri="http://schemas.openxmlformats.org/drawingml/2006/table">
@@ -30620,45 +30704,52 @@
                 <a:tableStyleId>{5C22544A-7EE6-4342-B048-85BDC9FD1C3A}</a:tableStyleId>
               </a:tblPr>
               <a:tblGrid>
-                <a:gridCol w="1030027">
+                <a:gridCol w="1009057">
                   <a:extLst>
                     <a:ext uri="{9D8B030D-6E8A-4147-A177-3AD203B41FA5}">
                       <a16:colId xmlns:a16="http://schemas.microsoft.com/office/drawing/2014/main" val="2403923919"/>
                     </a:ext>
                   </a:extLst>
                 </a:gridCol>
-                <a:gridCol w="1587500">
+                <a:gridCol w="1575957">
                   <a:extLst>
                     <a:ext uri="{9D8B030D-6E8A-4147-A177-3AD203B41FA5}">
                       <a16:colId xmlns:a16="http://schemas.microsoft.com/office/drawing/2014/main" val="2851018997"/>
                     </a:ext>
                   </a:extLst>
                 </a:gridCol>
-                <a:gridCol w="1587500">
+                <a:gridCol w="1575957">
                   <a:extLst>
                     <a:ext uri="{9D8B030D-6E8A-4147-A177-3AD203B41FA5}">
                       <a16:colId xmlns:a16="http://schemas.microsoft.com/office/drawing/2014/main" val="1127370515"/>
                     </a:ext>
                   </a:extLst>
                 </a:gridCol>
-                <a:gridCol w="1587500">
+                <a:gridCol w="1575957">
                   <a:extLst>
                     <a:ext uri="{9D8B030D-6E8A-4147-A177-3AD203B41FA5}">
                       <a16:colId xmlns:a16="http://schemas.microsoft.com/office/drawing/2014/main" val="4204235581"/>
                     </a:ext>
                   </a:extLst>
                 </a:gridCol>
-                <a:gridCol w="1587500">
+                <a:gridCol w="1575957">
                   <a:extLst>
                     <a:ext uri="{9D8B030D-6E8A-4147-A177-3AD203B41FA5}">
                       <a16:colId xmlns:a16="http://schemas.microsoft.com/office/drawing/2014/main" val="1679338898"/>
                     </a:ext>
                   </a:extLst>
                 </a:gridCol>
-                <a:gridCol w="1587500">
+                <a:gridCol w="1575957">
                   <a:extLst>
                     <a:ext uri="{9D8B030D-6E8A-4147-A177-3AD203B41FA5}">
                       <a16:colId xmlns:a16="http://schemas.microsoft.com/office/drawing/2014/main" val="3236875178"/>
+                    </a:ext>
+                  </a:extLst>
+                </a:gridCol>
+                <a:gridCol w="1575957">
+                  <a:extLst>
+                    <a:ext uri="{9D8B030D-6E8A-4147-A177-3AD203B41FA5}">
+                      <a16:colId xmlns:a16="http://schemas.microsoft.com/office/drawing/2014/main" val="749987061"/>
                     </a:ext>
                   </a:extLst>
                 </a:gridCol>
@@ -30709,11 +30800,14 @@
                     <a:p>
                       <a:pPr algn="ctr" fontAlgn="base"/>
                       <a:r>
-                        <a:rPr lang="en-US" b="1">
+                        <a:rPr lang="en-US" b="1" dirty="0" err="1">
                           <a:effectLst/>
                         </a:rPr>
                         <a:t>Codeium</a:t>
                       </a:r>
+                      <a:endParaRPr lang="en-US" b="1" dirty="0">
+                        <a:effectLst/>
+                      </a:endParaRPr>
                     </a:p>
                   </a:txBody>
                   <a:tcPr/>
@@ -30764,6 +30858,22 @@
                           <a:effectLst/>
                         </a:rPr>
                         <a:t>Hugging Chat</a:t>
+                      </a:r>
+                    </a:p>
+                  </a:txBody>
+                  <a:tcPr/>
+                </a:tc>
+                <a:tc>
+                  <a:txBody>
+                    <a:bodyPr/>
+                    <a:lstStyle/>
+                    <a:p>
+                      <a:pPr algn="ctr" fontAlgn="base"/>
+                      <a:r>
+                        <a:rPr lang="en-US" b="1" dirty="0">
+                          <a:effectLst/>
+                        </a:rPr>
+                        <a:t>Cline</a:t>
                       </a:r>
                     </a:p>
                   </a:txBody>
@@ -30828,13 +30938,27 @@
                         </a:rPr>
                         <a:t>Code completion and context-aware suggestions</a:t>
                       </a:r>
-                      <a:br>
-                        <a:rPr lang="en-US" sz="1400" dirty="0">
+                    </a:p>
+                    <a:p>
+                      <a:endParaRPr lang="en-US" sz="1400" dirty="0">
+                        <a:effectLst/>
+                        <a:latin typeface="Calibri" panose="020F0502020204030204" pitchFamily="34" charset="0"/>
+                        <a:cs typeface="Calibri" panose="020F0502020204030204" pitchFamily="34" charset="0"/>
+                      </a:endParaRPr>
+                    </a:p>
+                    <a:p>
+                      <a:r>
+                        <a:rPr lang="en-GB" sz="1400" kern="1200" dirty="0">
+                          <a:solidFill>
+                            <a:schemeClr val="dk1"/>
+                          </a:solidFill>
                           <a:effectLst/>
                           <a:latin typeface="Calibri" panose="020F0502020204030204" pitchFamily="34" charset="0"/>
+                          <a:ea typeface="+mn-ea"/>
                           <a:cs typeface="Calibri" panose="020F0502020204030204" pitchFamily="34" charset="0"/>
                         </a:rPr>
-                      </a:br>
+                        <a:t>Multiline functionality</a:t>
+                      </a:r>
                       <a:endParaRPr lang="en-US" sz="1400" dirty="0">
                         <a:effectLst/>
                         <a:latin typeface="Calibri" panose="020F0502020204030204" pitchFamily="34" charset="0"/>
@@ -30878,6 +31002,23 @@
                           <a:cs typeface="Calibri" panose="020F0502020204030204" pitchFamily="34" charset="0"/>
                         </a:rPr>
                         <a:t>Code refactoring capabilities</a:t>
+                      </a:r>
+                    </a:p>
+                    <a:p>
+                      <a:endParaRPr lang="en-US" sz="1400" dirty="0">
+                        <a:effectLst/>
+                        <a:latin typeface="Calibri" panose="020F0502020204030204" pitchFamily="34" charset="0"/>
+                        <a:cs typeface="Calibri" panose="020F0502020204030204" pitchFamily="34" charset="0"/>
+                      </a:endParaRPr>
+                    </a:p>
+                    <a:p>
+                      <a:r>
+                        <a:rPr lang="en-US" sz="1400" dirty="0">
+                          <a:effectLst/>
+                          <a:latin typeface="Calibri" panose="020F0502020204030204" pitchFamily="34" charset="0"/>
+                          <a:cs typeface="Calibri" panose="020F0502020204030204" pitchFamily="34" charset="0"/>
+                        </a:rPr>
+                        <a:t>Chat, Command, and Autocomplete function</a:t>
                       </a:r>
                     </a:p>
                   </a:txBody>
@@ -30996,6 +31137,68 @@
                         </a:rPr>
                         <a:t>High flexibility in deployment</a:t>
                       </a:r>
+                    </a:p>
+                  </a:txBody>
+                  <a:tcPr/>
+                </a:tc>
+                <a:tc>
+                  <a:txBody>
+                    <a:bodyPr/>
+                    <a:lstStyle/>
+                    <a:p>
+                      <a:r>
+                        <a:rPr lang="en-GB" sz="1400" kern="1200" dirty="0">
+                          <a:solidFill>
+                            <a:schemeClr val="dk1"/>
+                          </a:solidFill>
+                          <a:effectLst/>
+                          <a:latin typeface="Calibri" panose="020F0502020204030204" pitchFamily="34" charset="0"/>
+                          <a:ea typeface="+mn-ea"/>
+                          <a:cs typeface="Calibri" panose="020F0502020204030204" pitchFamily="34" charset="0"/>
+                        </a:rPr>
+                        <a:t>Terminal integration for executing commands</a:t>
+                      </a:r>
+                    </a:p>
+                    <a:p>
+                      <a:endParaRPr lang="en-GB" sz="1400" kern="1200" dirty="0">
+                        <a:solidFill>
+                          <a:schemeClr val="dk1"/>
+                        </a:solidFill>
+                        <a:effectLst/>
+                        <a:latin typeface="Calibri" panose="020F0502020204030204" pitchFamily="34" charset="0"/>
+                        <a:ea typeface="+mn-ea"/>
+                        <a:cs typeface="Calibri" panose="020F0502020204030204" pitchFamily="34" charset="0"/>
+                        <a:hlinkClick r:id="rId2">
+                          <a:extLst>
+                            <a:ext uri="{A12FA001-AC4F-418D-AE19-62706E023703}">
+                              <ahyp:hlinkClr xmlns:ahyp="http://schemas.microsoft.com/office/drawing/2018/hyperlinkcolor" val="tx"/>
+                            </a:ext>
+                          </a:extLst>
+                        </a:hlinkClick>
+                      </a:endParaRPr>
+                    </a:p>
+                    <a:p>
+                      <a:r>
+                        <a:rPr lang="en-GB" sz="1400" kern="1200" dirty="0">
+                          <a:solidFill>
+                            <a:schemeClr val="dk1"/>
+                          </a:solidFill>
+                          <a:effectLst/>
+                          <a:latin typeface="Calibri" panose="020F0502020204030204" pitchFamily="34" charset="0"/>
+                          <a:ea typeface="+mn-ea"/>
+                          <a:cs typeface="Calibri" panose="020F0502020204030204" pitchFamily="34" charset="0"/>
+                        </a:rPr>
+                        <a:t>Browser interaction for debugging and testing</a:t>
+                      </a:r>
+                      <a:endParaRPr lang="en-US" sz="1400" kern="1200" dirty="0">
+                        <a:solidFill>
+                          <a:schemeClr val="dk1"/>
+                        </a:solidFill>
+                        <a:effectLst/>
+                        <a:latin typeface="Calibri" panose="020F0502020204030204" pitchFamily="34" charset="0"/>
+                        <a:ea typeface="+mn-ea"/>
+                        <a:cs typeface="Calibri" panose="020F0502020204030204" pitchFamily="34" charset="0"/>
+                      </a:endParaRPr>
                     </a:p>
                   </a:txBody>
                   <a:tcPr/>
@@ -31188,6 +31391,36 @@
                   </a:txBody>
                   <a:tcPr/>
                 </a:tc>
+                <a:tc>
+                  <a:txBody>
+                    <a:bodyPr/>
+                    <a:lstStyle/>
+                    <a:p>
+                      <a:r>
+                        <a:rPr lang="en-GB" sz="1400" kern="1200" dirty="0">
+                          <a:solidFill>
+                            <a:schemeClr val="dk1"/>
+                          </a:solidFill>
+                          <a:effectLst/>
+                          <a:latin typeface="Calibri" panose="020F0502020204030204" pitchFamily="34" charset="0"/>
+                          <a:ea typeface="+mn-ea"/>
+                          <a:cs typeface="Calibri" panose="020F0502020204030204" pitchFamily="34" charset="0"/>
+                        </a:rPr>
+                        <a:t>Various programming languages</a:t>
+                      </a:r>
+                      <a:endParaRPr lang="en-NL" sz="1400" kern="1200" dirty="0">
+                        <a:solidFill>
+                          <a:schemeClr val="dk1"/>
+                        </a:solidFill>
+                        <a:effectLst/>
+                        <a:latin typeface="Calibri" panose="020F0502020204030204" pitchFamily="34" charset="0"/>
+                        <a:ea typeface="+mn-ea"/>
+                        <a:cs typeface="Calibri" panose="020F0502020204030204" pitchFamily="34" charset="0"/>
+                      </a:endParaRPr>
+                    </a:p>
+                  </a:txBody>
+                  <a:tcPr/>
+                </a:tc>
                 <a:extLst>
                   <a:ext uri="{0D108BD9-81ED-4DB2-BD59-A6C34878D82A}">
                     <a16:rowId xmlns:a16="http://schemas.microsoft.com/office/drawing/2014/main" val="3902504948"/>
@@ -31335,6 +31568,40 @@
                   </a:txBody>
                   <a:tcPr/>
                 </a:tc>
+                <a:tc>
+                  <a:txBody>
+                    <a:bodyPr/>
+                    <a:lstStyle/>
+                    <a:p>
+                      <a:pPr marL="0" indent="0">
+                        <a:buFont typeface="Arial" panose="020B0604020202020204" pitchFamily="34" charset="0"/>
+                        <a:buNone/>
+                      </a:pPr>
+                      <a:r>
+                        <a:rPr lang="en-GB" sz="1400" kern="1200" dirty="0">
+                          <a:solidFill>
+                            <a:schemeClr val="dk1"/>
+                          </a:solidFill>
+                          <a:effectLst/>
+                          <a:latin typeface="Calibri" panose="020F0502020204030204" pitchFamily="34" charset="0"/>
+                          <a:ea typeface="+mn-ea"/>
+                          <a:cs typeface="Calibri" panose="020F0502020204030204" pitchFamily="34" charset="0"/>
+                        </a:rPr>
+                        <a:t>Human-in-the-loop approach</a:t>
+                      </a:r>
+                      <a:endParaRPr lang="en-US" sz="1400" kern="1200" dirty="0">
+                        <a:solidFill>
+                          <a:schemeClr val="dk1"/>
+                        </a:solidFill>
+                        <a:effectLst/>
+                        <a:latin typeface="Calibri" panose="020F0502020204030204" pitchFamily="34" charset="0"/>
+                        <a:ea typeface="+mn-ea"/>
+                        <a:cs typeface="Calibri" panose="020F0502020204030204" pitchFamily="34" charset="0"/>
+                      </a:endParaRPr>
+                    </a:p>
+                  </a:txBody>
+                  <a:tcPr/>
+                </a:tc>
                 <a:extLst>
                   <a:ext uri="{0D108BD9-81ED-4DB2-BD59-A6C34878D82A}">
                     <a16:rowId xmlns:a16="http://schemas.microsoft.com/office/drawing/2014/main" val="3976148086"/>
@@ -31367,9 +31634,9 @@
                     <a:bodyPr/>
                     <a:lstStyle/>
                     <a:p>
-                      <a:pPr marL="285750" indent="-285750">
+                      <a:pPr marL="0" indent="0">
                         <a:buFont typeface="Arial" panose="020B0604020202020204" pitchFamily="34" charset="0"/>
-                        <a:buChar char="•"/>
+                        <a:buNone/>
                       </a:pPr>
                       <a:r>
                         <a:rPr lang="en-US" sz="1400" kern="1200" dirty="0">
@@ -31391,9 +31658,9 @@
                     <a:bodyPr/>
                     <a:lstStyle/>
                     <a:p>
-                      <a:pPr marL="285750" indent="-285750">
+                      <a:pPr marL="0" indent="0">
                         <a:buFont typeface="Arial" panose="020B0604020202020204" pitchFamily="34" charset="0"/>
-                        <a:buChar char="•"/>
+                        <a:buNone/>
                       </a:pPr>
                       <a:r>
                         <a:rPr lang="en-US" sz="1400" kern="1200" dirty="0">
@@ -31415,9 +31682,9 @@
                     <a:bodyPr/>
                     <a:lstStyle/>
                     <a:p>
-                      <a:pPr marL="285750" indent="-285750">
+                      <a:pPr marL="0" indent="0">
                         <a:buFont typeface="Arial" panose="020B0604020202020204" pitchFamily="34" charset="0"/>
-                        <a:buChar char="•"/>
+                        <a:buNone/>
                       </a:pPr>
                       <a:r>
                         <a:rPr lang="en-US" sz="1400" kern="1200" dirty="0">
@@ -31439,9 +31706,9 @@
                     <a:bodyPr/>
                     <a:lstStyle/>
                     <a:p>
-                      <a:pPr marL="285750" indent="-285750">
+                      <a:pPr marL="0" indent="0">
                         <a:buFont typeface="Arial" panose="020B0604020202020204" pitchFamily="34" charset="0"/>
-                        <a:buChar char="•"/>
+                        <a:buNone/>
                       </a:pPr>
                       <a:r>
                         <a:rPr lang="en-US" sz="1400" kern="1200" dirty="0">
@@ -31463,9 +31730,9 @@
                     <a:bodyPr/>
                     <a:lstStyle/>
                     <a:p>
-                      <a:pPr marL="285750" indent="-285750">
+                      <a:pPr marL="0" indent="0">
                         <a:buFont typeface="Arial" panose="020B0604020202020204" pitchFamily="34" charset="0"/>
-                        <a:buChar char="•"/>
+                        <a:buNone/>
                       </a:pPr>
                       <a:r>
                         <a:rPr lang="en-US" sz="1400" kern="1200" dirty="0">
@@ -31478,6 +31745,40 @@
                         </a:rPr>
                         <a:t>Both free and paid versions</a:t>
                       </a:r>
+                    </a:p>
+                  </a:txBody>
+                  <a:tcPr/>
+                </a:tc>
+                <a:tc>
+                  <a:txBody>
+                    <a:bodyPr/>
+                    <a:lstStyle/>
+                    <a:p>
+                      <a:pPr marL="0" indent="0">
+                        <a:buFont typeface="Arial" panose="020B0604020202020204" pitchFamily="34" charset="0"/>
+                        <a:buNone/>
+                      </a:pPr>
+                      <a:r>
+                        <a:rPr lang="en-GB" sz="1400" kern="1200" dirty="0">
+                          <a:solidFill>
+                            <a:schemeClr val="dk1"/>
+                          </a:solidFill>
+                          <a:effectLst/>
+                          <a:latin typeface="Calibri" panose="020F0502020204030204" pitchFamily="34" charset="0"/>
+                          <a:ea typeface="+mn-ea"/>
+                          <a:cs typeface="Calibri" panose="020F0502020204030204" pitchFamily="34" charset="0"/>
+                        </a:rPr>
+                        <a:t>Free, open-source</a:t>
+                      </a:r>
+                      <a:endParaRPr lang="en-US" sz="1400" kern="1200" dirty="0">
+                        <a:solidFill>
+                          <a:schemeClr val="dk1"/>
+                        </a:solidFill>
+                        <a:effectLst/>
+                        <a:latin typeface="Calibri" panose="020F0502020204030204" pitchFamily="34" charset="0"/>
+                        <a:ea typeface="+mn-ea"/>
+                        <a:cs typeface="Calibri" panose="020F0502020204030204" pitchFamily="34" charset="0"/>
+                      </a:endParaRPr>
                     </a:p>
                   </a:txBody>
                   <a:tcPr/>
@@ -31507,7 +31808,7 @@
           <p:nvPr/>
         </p:nvPicPr>
         <p:blipFill>
-          <a:blip r:embed="rId2">
+          <a:blip r:embed="rId3">
             <a:extLst>
               <a:ext uri="{28A0092B-C50C-407E-A947-70E740481C1C}">
                 <a14:useLocalDpi xmlns:a14="http://schemas.microsoft.com/office/drawing/2010/main" val="0"/>
@@ -31521,7 +31822,7 @@
         </p:blipFill>
         <p:spPr bwMode="auto">
           <a:xfrm>
-            <a:off x="3489213" y="1548470"/>
+            <a:off x="2814103" y="1327489"/>
             <a:ext cx="553520" cy="553520"/>
           </a:xfrm>
           <a:prstGeom prst="rect">
@@ -31554,7 +31855,7 @@
           <p:nvPr/>
         </p:nvPicPr>
         <p:blipFill>
-          <a:blip r:embed="rId3">
+          <a:blip r:embed="rId4">
             <a:extLst>
               <a:ext uri="{28A0092B-C50C-407E-A947-70E740481C1C}">
                 <a14:useLocalDpi xmlns:a14="http://schemas.microsoft.com/office/drawing/2010/main" val="0"/>
@@ -31568,7 +31869,7 @@
         </p:blipFill>
         <p:spPr bwMode="auto">
           <a:xfrm>
-            <a:off x="5100789" y="1587573"/>
+            <a:off x="4423712" y="1344667"/>
             <a:ext cx="475315" cy="475315"/>
           </a:xfrm>
           <a:prstGeom prst="rect">
@@ -31601,7 +31902,7 @@
           <p:nvPr/>
         </p:nvPicPr>
         <p:blipFill>
-          <a:blip r:embed="rId4">
+          <a:blip r:embed="rId5">
             <a:extLst>
               <a:ext uri="{28A0092B-C50C-407E-A947-70E740481C1C}">
                 <a14:useLocalDpi xmlns:a14="http://schemas.microsoft.com/office/drawing/2010/main" val="0"/>
@@ -31615,7 +31916,7 @@
         </p:blipFill>
         <p:spPr bwMode="auto">
           <a:xfrm>
-            <a:off x="6692327" y="1591716"/>
+            <a:off x="5955116" y="1353797"/>
             <a:ext cx="482266" cy="482266"/>
           </a:xfrm>
           <a:prstGeom prst="rect">
@@ -31648,7 +31949,7 @@
           <p:nvPr/>
         </p:nvPicPr>
         <p:blipFill>
-          <a:blip r:embed="rId5">
+          <a:blip r:embed="rId6">
             <a:extLst>
               <a:ext uri="{28A0092B-C50C-407E-A947-70E740481C1C}">
                 <a14:useLocalDpi xmlns:a14="http://schemas.microsoft.com/office/drawing/2010/main" val="0"/>
@@ -31662,7 +31963,7 @@
         </p:blipFill>
         <p:spPr bwMode="auto">
           <a:xfrm>
-            <a:off x="8365749" y="1587573"/>
+            <a:off x="7524377" y="1311219"/>
             <a:ext cx="475315" cy="475315"/>
           </a:xfrm>
           <a:prstGeom prst="rect">
@@ -31695,7 +31996,7 @@
           <p:nvPr/>
         </p:nvPicPr>
         <p:blipFill>
-          <a:blip r:embed="rId6">
+          <a:blip r:embed="rId7">
             <a:extLst>
               <a:ext uri="{28A0092B-C50C-407E-A947-70E740481C1C}">
                 <a14:useLocalDpi xmlns:a14="http://schemas.microsoft.com/office/drawing/2010/main" val="0"/>
@@ -31709,7 +32010,7 @@
         </p:blipFill>
         <p:spPr bwMode="auto">
           <a:xfrm>
-            <a:off x="9932733" y="1541966"/>
+            <a:off x="9137496" y="1337716"/>
             <a:ext cx="482266" cy="482266"/>
           </a:xfrm>
           <a:prstGeom prst="rect">
@@ -31725,6 +32026,59 @@
               </a14:hiddenFill>
             </a:ext>
           </a:extLst>
+        </p:spPr>
+      </p:pic>
+      <p:pic>
+        <p:nvPicPr>
+          <p:cNvPr id="3" name="Picture 2">
+            <a:extLst>
+              <a:ext uri="{FF2B5EF4-FFF2-40B4-BE49-F238E27FC236}">
+                <a16:creationId xmlns:a16="http://schemas.microsoft.com/office/drawing/2014/main" id="{ABE2776A-8651-35EE-B7F7-763B0DBC36C4}"/>
+              </a:ext>
+            </a:extLst>
+          </p:cNvPr>
+          <p:cNvPicPr>
+            <a:picLocks noChangeAspect="1"/>
+          </p:cNvPicPr>
+          <p:nvPr/>
+        </p:nvPicPr>
+        <p:blipFill rotWithShape="1">
+          <a:blip r:embed="rId8">
+            <a:extLst>
+              <a:ext uri="{BEBA8EAE-BF5A-486C-A8C5-ECC9F3942E4B}">
+                <a14:imgProps xmlns:a14="http://schemas.microsoft.com/office/drawing/2010/main">
+                  <a14:imgLayer r:embed="rId9">
+                    <a14:imgEffect>
+                      <a14:backgroundRemoval t="40401" b="93410" l="3487" r="31379">
+                        <a14:foregroundMark x1="8875" y1="42120" x2="8875" y2="42120"/>
+                        <a14:foregroundMark x1="8082" y1="42693" x2="8082" y2="42693"/>
+                        <a14:foregroundMark x1="20476" y1="40496" x2="21078" y2="40401"/>
+                        <a14:foregroundMark x1="10143" y1="42120" x2="16744" y2="41082"/>
+                        <a14:foregroundMark x1="31062" y1="50716" x2="31062" y2="60745"/>
+                        <a14:foregroundMark x1="7607" y1="44986" x2="7290" y2="43840"/>
+                        <a14:backgroundMark x1="7765" y1="42120" x2="7765" y2="42120"/>
+                        <a14:backgroundMark x1="7924" y1="42407" x2="7924" y2="42407"/>
+                        <a14:backgroundMark x1="20919" y1="40115" x2="20919" y2="40115"/>
+                        <a14:backgroundMark x1="21236" y1="40115" x2="27734" y2="41547"/>
+                        <a14:backgroundMark x1="20444" y1="40401" x2="16323" y2="39828"/>
+                      </a14:backgroundRemoval>
+                    </a14:imgEffect>
+                  </a14:imgLayer>
+                </a14:imgProps>
+              </a:ext>
+            </a:extLst>
+          </a:blip>
+          <a:srcRect t="36629" r="64791"/>
+          <a:stretch/>
+        </p:blipFill>
+        <p:spPr>
+          <a:xfrm>
+            <a:off x="10625042" y="1285440"/>
+            <a:ext cx="627168" cy="624345"/>
+          </a:xfrm>
+          <a:prstGeom prst="rect">
+            <a:avLst/>
+          </a:prstGeom>
         </p:spPr>
       </p:pic>
     </p:spTree>
@@ -33352,7 +33706,7 @@
     <p:bg>
       <p:bgPr>
         <a:blipFill dpi="0" rotWithShape="1">
-          <a:blip r:embed="rId3">
+          <a:blip r:embed="rId4">
             <a:lum/>
           </a:blip>
           <a:srcRect/>
@@ -33377,214 +33731,242 @@
           <a:chExt cx="0" cy="0"/>
         </a:xfrm>
       </p:grpSpPr>
-      <p:graphicFrame>
-        <p:nvGraphicFramePr>
-          <p:cNvPr id="3" name="Diagram 2">
+      <p:grpSp>
+        <p:nvGrpSpPr>
+          <p:cNvPr id="5" name="Group 4">
             <a:extLst>
               <a:ext uri="{FF2B5EF4-FFF2-40B4-BE49-F238E27FC236}">
-                <a16:creationId xmlns:a16="http://schemas.microsoft.com/office/drawing/2014/main" id="{969DDF1E-9A93-785D-081C-F65758C0E4AE}"/>
+                <a16:creationId xmlns:a16="http://schemas.microsoft.com/office/drawing/2014/main" id="{C6E5FC36-9E1A-5696-A89C-60AF87CE3EC6}"/>
               </a:ext>
             </a:extLst>
           </p:cNvPr>
-          <p:cNvGraphicFramePr/>
-          <p:nvPr>
-            <p:extLst>
-              <p:ext uri="{D42A27DB-BD31-4B8C-83A1-F6EECF244321}">
-                <p14:modId xmlns:p14="http://schemas.microsoft.com/office/powerpoint/2010/main" val="1640077957"/>
-              </p:ext>
-            </p:extLst>
-          </p:nvPr>
-        </p:nvGraphicFramePr>
-        <p:xfrm>
-          <a:off x="2353455" y="2983043"/>
-          <a:ext cx="9263921" cy="3672590"/>
-        </p:xfrm>
-        <a:graphic>
-          <a:graphicData uri="http://schemas.openxmlformats.org/drawingml/2006/diagram">
-            <dgm:relIds xmlns:dgm="http://schemas.openxmlformats.org/drawingml/2006/diagram" xmlns:r="http://schemas.openxmlformats.org/officeDocument/2006/relationships" r:dm="rId4" r:lo="rId5" r:qs="rId6" r:cs="rId7"/>
-          </a:graphicData>
-        </a:graphic>
-      </p:graphicFrame>
-      <p:sp>
-        <p:nvSpPr>
-          <p:cNvPr id="15" name="Arrow: Right 14">
-            <a:extLst>
-              <a:ext uri="{FF2B5EF4-FFF2-40B4-BE49-F238E27FC236}">
-                <a16:creationId xmlns:a16="http://schemas.microsoft.com/office/drawing/2014/main" id="{F28881D3-2AE7-DCBF-454E-4AA44ABB33BB}"/>
-              </a:ext>
-            </a:extLst>
-          </p:cNvPr>
-          <p:cNvSpPr/>
+          <p:cNvGrpSpPr/>
           <p:nvPr/>
-        </p:nvSpPr>
-        <p:spPr>
+        </p:nvGrpSpPr>
+        <p:grpSpPr>
           <a:xfrm>
-            <a:off x="9688539" y="3128365"/>
-            <a:ext cx="431800" cy="596900"/>
+            <a:off x="2044700" y="2614743"/>
+            <a:ext cx="10007600" cy="3672590"/>
+            <a:chOff x="2353455" y="2983043"/>
+            <a:chExt cx="9263921" cy="3672590"/>
           </a:xfrm>
-          <a:prstGeom prst="rightArrow">
-            <a:avLst/>
-          </a:prstGeom>
-          <a:ln/>
-        </p:spPr>
-        <p:style>
-          <a:lnRef idx="2">
-            <a:schemeClr val="accent1"/>
-          </a:lnRef>
-          <a:fillRef idx="1">
-            <a:schemeClr val="lt1"/>
-          </a:fillRef>
-          <a:effectRef idx="0">
-            <a:schemeClr val="accent1"/>
-          </a:effectRef>
-          <a:fontRef idx="minor">
-            <a:schemeClr val="dk1"/>
-          </a:fontRef>
-        </p:style>
-        <p:txBody>
-          <a:bodyPr rtlCol="0" anchor="ctr"/>
-          <a:lstStyle/>
-          <a:p>
-            <a:pPr algn="ctr"/>
-            <a:endParaRPr lang="en-US"/>
-          </a:p>
-        </p:txBody>
-      </p:sp>
-      <p:sp>
-        <p:nvSpPr>
-          <p:cNvPr id="16" name="Arrow: Right 15">
-            <a:extLst>
-              <a:ext uri="{FF2B5EF4-FFF2-40B4-BE49-F238E27FC236}">
-                <a16:creationId xmlns:a16="http://schemas.microsoft.com/office/drawing/2014/main" id="{3D315DCA-F5C5-9FD1-C099-4EAA7FE23DC5}"/>
-              </a:ext>
-            </a:extLst>
-          </p:cNvPr>
-          <p:cNvSpPr/>
-          <p:nvPr/>
-        </p:nvSpPr>
-        <p:spPr>
-          <a:xfrm>
-            <a:off x="7759702" y="3128365"/>
-            <a:ext cx="431800" cy="596900"/>
-          </a:xfrm>
-          <a:prstGeom prst="rightArrow">
-            <a:avLst/>
-          </a:prstGeom>
-          <a:ln/>
-        </p:spPr>
-        <p:style>
-          <a:lnRef idx="2">
-            <a:schemeClr val="accent1"/>
-          </a:lnRef>
-          <a:fillRef idx="1">
-            <a:schemeClr val="lt1"/>
-          </a:fillRef>
-          <a:effectRef idx="0">
-            <a:schemeClr val="accent1"/>
-          </a:effectRef>
-          <a:fontRef idx="minor">
-            <a:schemeClr val="dk1"/>
-          </a:fontRef>
-        </p:style>
-        <p:txBody>
-          <a:bodyPr rtlCol="0" anchor="ctr"/>
-          <a:lstStyle/>
-          <a:p>
-            <a:pPr algn="ctr"/>
-            <a:endParaRPr lang="en-US"/>
-          </a:p>
-        </p:txBody>
-      </p:sp>
-      <p:sp>
-        <p:nvSpPr>
-          <p:cNvPr id="17" name="Arrow: Right 16">
-            <a:extLst>
-              <a:ext uri="{FF2B5EF4-FFF2-40B4-BE49-F238E27FC236}">
-                <a16:creationId xmlns:a16="http://schemas.microsoft.com/office/drawing/2014/main" id="{86911162-414B-F085-62EF-C5545A3075FD}"/>
-              </a:ext>
-            </a:extLst>
-          </p:cNvPr>
-          <p:cNvSpPr/>
-          <p:nvPr/>
-        </p:nvSpPr>
-        <p:spPr>
-          <a:xfrm>
-            <a:off x="5863445" y="3129093"/>
-            <a:ext cx="431800" cy="596900"/>
-          </a:xfrm>
-          <a:prstGeom prst="rightArrow">
-            <a:avLst/>
-          </a:prstGeom>
-          <a:ln/>
-        </p:spPr>
-        <p:style>
-          <a:lnRef idx="2">
-            <a:schemeClr val="accent1"/>
-          </a:lnRef>
-          <a:fillRef idx="1">
-            <a:schemeClr val="lt1"/>
-          </a:fillRef>
-          <a:effectRef idx="0">
-            <a:schemeClr val="accent1"/>
-          </a:effectRef>
-          <a:fontRef idx="minor">
-            <a:schemeClr val="dk1"/>
-          </a:fontRef>
-        </p:style>
-        <p:txBody>
-          <a:bodyPr rtlCol="0" anchor="ctr"/>
-          <a:lstStyle/>
-          <a:p>
-            <a:pPr algn="ctr"/>
-            <a:endParaRPr lang="en-US"/>
-          </a:p>
-        </p:txBody>
-      </p:sp>
-      <p:sp>
-        <p:nvSpPr>
-          <p:cNvPr id="18" name="Arrow: Right 17">
-            <a:extLst>
-              <a:ext uri="{FF2B5EF4-FFF2-40B4-BE49-F238E27FC236}">
-                <a16:creationId xmlns:a16="http://schemas.microsoft.com/office/drawing/2014/main" id="{FFE97C11-606A-6BBC-FA5B-58AEE1FD51C4}"/>
-              </a:ext>
-            </a:extLst>
-          </p:cNvPr>
-          <p:cNvSpPr/>
-          <p:nvPr/>
-        </p:nvSpPr>
-        <p:spPr>
-          <a:xfrm>
-            <a:off x="4000500" y="3129093"/>
-            <a:ext cx="431800" cy="596900"/>
-          </a:xfrm>
-          <a:prstGeom prst="rightArrow">
-            <a:avLst/>
-          </a:prstGeom>
-          <a:ln/>
-        </p:spPr>
-        <p:style>
-          <a:lnRef idx="2">
-            <a:schemeClr val="accent1"/>
-          </a:lnRef>
-          <a:fillRef idx="1">
-            <a:schemeClr val="lt1"/>
-          </a:fillRef>
-          <a:effectRef idx="0">
-            <a:schemeClr val="accent1"/>
-          </a:effectRef>
-          <a:fontRef idx="minor">
-            <a:schemeClr val="dk1"/>
-          </a:fontRef>
-        </p:style>
-        <p:txBody>
-          <a:bodyPr rtlCol="0" anchor="ctr"/>
-          <a:lstStyle/>
-          <a:p>
-            <a:pPr algn="ctr"/>
-            <a:endParaRPr lang="en-US"/>
-          </a:p>
-        </p:txBody>
-      </p:sp>
+          <a:solidFill>
+            <a:schemeClr val="bg1"/>
+          </a:solidFill>
+        </p:grpSpPr>
+        <p:graphicFrame>
+          <p:nvGraphicFramePr>
+            <p:cNvPr id="3" name="Diagram 2">
+              <a:extLst>
+                <a:ext uri="{FF2B5EF4-FFF2-40B4-BE49-F238E27FC236}">
+                  <a16:creationId xmlns:a16="http://schemas.microsoft.com/office/drawing/2014/main" id="{969DDF1E-9A93-785D-081C-F65758C0E4AE}"/>
+                </a:ext>
+              </a:extLst>
+            </p:cNvPr>
+            <p:cNvGraphicFramePr/>
+            <p:nvPr>
+              <p:extLst>
+                <p:ext uri="{D42A27DB-BD31-4B8C-83A1-F6EECF244321}">
+                  <p14:modId xmlns:p14="http://schemas.microsoft.com/office/powerpoint/2010/main" val="1123582041"/>
+                </p:ext>
+              </p:extLst>
+            </p:nvPr>
+          </p:nvGraphicFramePr>
+          <p:xfrm>
+            <a:off x="2353455" y="2983043"/>
+            <a:ext cx="9263921" cy="3672590"/>
+          </p:xfrm>
+          <a:graphic>
+            <a:graphicData uri="http://schemas.openxmlformats.org/drawingml/2006/diagram">
+              <dgm:relIds xmlns:dgm="http://schemas.openxmlformats.org/drawingml/2006/diagram" xmlns:r="http://schemas.openxmlformats.org/officeDocument/2006/relationships" r:dm="rId5" r:lo="rId6" r:qs="rId7" r:cs="rId8"/>
+            </a:graphicData>
+          </a:graphic>
+        </p:graphicFrame>
+        <p:sp>
+          <p:nvSpPr>
+            <p:cNvPr id="15" name="Arrow: Right 14">
+              <a:extLst>
+                <a:ext uri="{FF2B5EF4-FFF2-40B4-BE49-F238E27FC236}">
+                  <a16:creationId xmlns:a16="http://schemas.microsoft.com/office/drawing/2014/main" id="{F28881D3-2AE7-DCBF-454E-4AA44ABB33BB}"/>
+                </a:ext>
+              </a:extLst>
+            </p:cNvPr>
+            <p:cNvSpPr/>
+            <p:nvPr/>
+          </p:nvSpPr>
+          <p:spPr>
+            <a:xfrm>
+              <a:off x="9688539" y="3420465"/>
+              <a:ext cx="431800" cy="596900"/>
+            </a:xfrm>
+            <a:prstGeom prst="rightArrow">
+              <a:avLst/>
+            </a:prstGeom>
+            <a:grpFill/>
+            <a:ln/>
+          </p:spPr>
+          <p:style>
+            <a:lnRef idx="2">
+              <a:schemeClr val="accent1"/>
+            </a:lnRef>
+            <a:fillRef idx="1">
+              <a:schemeClr val="lt1"/>
+            </a:fillRef>
+            <a:effectRef idx="0">
+              <a:schemeClr val="accent1"/>
+            </a:effectRef>
+            <a:fontRef idx="minor">
+              <a:schemeClr val="dk1"/>
+            </a:fontRef>
+          </p:style>
+          <p:txBody>
+            <a:bodyPr rtlCol="0" anchor="ctr"/>
+            <a:lstStyle/>
+            <a:p>
+              <a:pPr algn="ctr"/>
+              <a:endParaRPr lang="en-US"/>
+            </a:p>
+          </p:txBody>
+        </p:sp>
+        <p:sp>
+          <p:nvSpPr>
+            <p:cNvPr id="16" name="Arrow: Right 15">
+              <a:extLst>
+                <a:ext uri="{FF2B5EF4-FFF2-40B4-BE49-F238E27FC236}">
+                  <a16:creationId xmlns:a16="http://schemas.microsoft.com/office/drawing/2014/main" id="{3D315DCA-F5C5-9FD1-C099-4EAA7FE23DC5}"/>
+                </a:ext>
+              </a:extLst>
+            </p:cNvPr>
+            <p:cNvSpPr/>
+            <p:nvPr/>
+          </p:nvSpPr>
+          <p:spPr>
+            <a:xfrm>
+              <a:off x="7759702" y="3420465"/>
+              <a:ext cx="431800" cy="596900"/>
+            </a:xfrm>
+            <a:prstGeom prst="rightArrow">
+              <a:avLst/>
+            </a:prstGeom>
+            <a:grpFill/>
+            <a:ln/>
+          </p:spPr>
+          <p:style>
+            <a:lnRef idx="2">
+              <a:schemeClr val="accent1"/>
+            </a:lnRef>
+            <a:fillRef idx="1">
+              <a:schemeClr val="lt1"/>
+            </a:fillRef>
+            <a:effectRef idx="0">
+              <a:schemeClr val="accent1"/>
+            </a:effectRef>
+            <a:fontRef idx="minor">
+              <a:schemeClr val="dk1"/>
+            </a:fontRef>
+          </p:style>
+          <p:txBody>
+            <a:bodyPr rtlCol="0" anchor="ctr"/>
+            <a:lstStyle/>
+            <a:p>
+              <a:pPr algn="ctr"/>
+              <a:endParaRPr lang="en-US"/>
+            </a:p>
+          </p:txBody>
+        </p:sp>
+        <p:sp>
+          <p:nvSpPr>
+            <p:cNvPr id="17" name="Arrow: Right 16">
+              <a:extLst>
+                <a:ext uri="{FF2B5EF4-FFF2-40B4-BE49-F238E27FC236}">
+                  <a16:creationId xmlns:a16="http://schemas.microsoft.com/office/drawing/2014/main" id="{86911162-414B-F085-62EF-C5545A3075FD}"/>
+                </a:ext>
+              </a:extLst>
+            </p:cNvPr>
+            <p:cNvSpPr/>
+            <p:nvPr/>
+          </p:nvSpPr>
+          <p:spPr>
+            <a:xfrm>
+              <a:off x="5863445" y="3421193"/>
+              <a:ext cx="431800" cy="596900"/>
+            </a:xfrm>
+            <a:prstGeom prst="rightArrow">
+              <a:avLst/>
+            </a:prstGeom>
+            <a:grpFill/>
+            <a:ln/>
+          </p:spPr>
+          <p:style>
+            <a:lnRef idx="2">
+              <a:schemeClr val="accent1"/>
+            </a:lnRef>
+            <a:fillRef idx="1">
+              <a:schemeClr val="lt1"/>
+            </a:fillRef>
+            <a:effectRef idx="0">
+              <a:schemeClr val="accent1"/>
+            </a:effectRef>
+            <a:fontRef idx="minor">
+              <a:schemeClr val="dk1"/>
+            </a:fontRef>
+          </p:style>
+          <p:txBody>
+            <a:bodyPr rtlCol="0" anchor="ctr"/>
+            <a:lstStyle/>
+            <a:p>
+              <a:pPr algn="ctr"/>
+              <a:endParaRPr lang="en-US"/>
+            </a:p>
+          </p:txBody>
+        </p:sp>
+        <p:sp>
+          <p:nvSpPr>
+            <p:cNvPr id="18" name="Arrow: Right 17">
+              <a:extLst>
+                <a:ext uri="{FF2B5EF4-FFF2-40B4-BE49-F238E27FC236}">
+                  <a16:creationId xmlns:a16="http://schemas.microsoft.com/office/drawing/2014/main" id="{FFE97C11-606A-6BBC-FA5B-58AEE1FD51C4}"/>
+                </a:ext>
+              </a:extLst>
+            </p:cNvPr>
+            <p:cNvSpPr/>
+            <p:nvPr/>
+          </p:nvSpPr>
+          <p:spPr>
+            <a:xfrm>
+              <a:off x="4000500" y="3421193"/>
+              <a:ext cx="431800" cy="596900"/>
+            </a:xfrm>
+            <a:prstGeom prst="rightArrow">
+              <a:avLst/>
+            </a:prstGeom>
+            <a:grpFill/>
+            <a:ln/>
+          </p:spPr>
+          <p:style>
+            <a:lnRef idx="2">
+              <a:schemeClr val="accent1"/>
+            </a:lnRef>
+            <a:fillRef idx="1">
+              <a:schemeClr val="lt1"/>
+            </a:fillRef>
+            <a:effectRef idx="0">
+              <a:schemeClr val="accent1"/>
+            </a:effectRef>
+            <a:fontRef idx="minor">
+              <a:schemeClr val="dk1"/>
+            </a:fontRef>
+          </p:style>
+          <p:txBody>
+            <a:bodyPr rtlCol="0" anchor="ctr"/>
+            <a:lstStyle/>
+            <a:p>
+              <a:pPr algn="ctr"/>
+              <a:endParaRPr lang="en-US"/>
+            </a:p>
+          </p:txBody>
+        </p:sp>
+      </p:grpSp>
       <p:sp>
         <p:nvSpPr>
           <p:cNvPr id="19" name="Text Placeholder 1">
@@ -33823,16 +34205,166 @@
           </a:p>
         </p:txBody>
       </p:sp>
+      <p:sp>
+        <p:nvSpPr>
+          <p:cNvPr id="10" name="TextBox 9">
+            <a:extLst>
+              <a:ext uri="{FF2B5EF4-FFF2-40B4-BE49-F238E27FC236}">
+                <a16:creationId xmlns:a16="http://schemas.microsoft.com/office/drawing/2014/main" id="{4B318F50-E328-0B0B-E694-2F49C0E2F9B6}"/>
+              </a:ext>
+            </a:extLst>
+          </p:cNvPr>
+          <p:cNvSpPr txBox="1"/>
+          <p:nvPr/>
+        </p:nvSpPr>
+        <p:spPr>
+          <a:xfrm>
+            <a:off x="4339086" y="6155804"/>
+            <a:ext cx="6096000" cy="584775"/>
+          </a:xfrm>
+          <a:prstGeom prst="rect">
+            <a:avLst/>
+          </a:prstGeom>
+        </p:spPr>
+        <p:style>
+          <a:lnRef idx="0">
+            <a:schemeClr val="accent3"/>
+          </a:lnRef>
+          <a:fillRef idx="3">
+            <a:schemeClr val="accent3"/>
+          </a:fillRef>
+          <a:effectRef idx="3">
+            <a:schemeClr val="accent3"/>
+          </a:effectRef>
+          <a:fontRef idx="minor">
+            <a:schemeClr val="lt1"/>
+          </a:fontRef>
+        </p:style>
+        <p:txBody>
+          <a:bodyPr wrap="square">
+            <a:spAutoFit/>
+          </a:bodyPr>
+          <a:lstStyle/>
+          <a:p>
+            <a:r>
+              <a:rPr lang="en-US" sz="1600" b="1" dirty="0">
+                <a:solidFill>
+                  <a:sysClr val="windowText" lastClr="000000"/>
+                </a:solidFill>
+                <a:latin typeface="Calibri" panose="020F0502020204030204" pitchFamily="34" charset="0"/>
+                <a:cs typeface="Calibri" panose="020F0502020204030204" pitchFamily="34" charset="0"/>
+              </a:rPr>
+              <a:t>Note.</a:t>
+            </a:r>
+            <a:r>
+              <a:rPr lang="en-US" sz="1600" dirty="0">
+                <a:latin typeface="Calibri" panose="020F0502020204030204" pitchFamily="34" charset="0"/>
+                <a:cs typeface="Calibri" panose="020F0502020204030204" pitchFamily="34" charset="0"/>
+              </a:rPr>
+              <a:t> </a:t>
+            </a:r>
+            <a:r>
+              <a:rPr lang="en-GB" sz="1600" b="0" i="0" dirty="0">
+                <a:solidFill>
+                  <a:srgbClr val="1F2328"/>
+                </a:solidFill>
+                <a:effectLst/>
+                <a:latin typeface="-apple-system"/>
+              </a:rPr>
+              <a:t>AI coder might be fine-tuned from a foundation model instead of trained from scratch</a:t>
+            </a:r>
+            <a:endParaRPr lang="en-GB" sz="1600" dirty="0"/>
+          </a:p>
+        </p:txBody>
+      </p:sp>
     </p:spTree>
     <p:extLst>
       <p:ext uri="{BB962C8B-B14F-4D97-AF65-F5344CB8AC3E}">
-        <p14:creationId xmlns:p14="http://schemas.microsoft.com/office/powerpoint/2010/main" val="2351697823"/>
+        <p14:creationId xmlns:p14="http://schemas.microsoft.com/office/powerpoint/2010/main" val="3829948958"/>
       </p:ext>
     </p:extLst>
   </p:cSld>
   <p:clrMapOvr>
     <a:overrideClrMapping bg1="lt1" tx1="dk1" bg2="lt2" tx2="dk2" accent1="accent1" accent2="accent2" accent3="accent3" accent4="accent4" accent5="accent5" accent6="accent6" hlink="hlink" folHlink="folHlink"/>
   </p:clrMapOvr>
+  <p:timing>
+    <p:tnLst>
+      <p:par>
+        <p:cTn id="1" dur="indefinite" restart="never" nodeType="tmRoot">
+          <p:childTnLst>
+            <p:seq concurrent="1" nextAc="seek">
+              <p:cTn id="2" dur="indefinite" nodeType="mainSeq">
+                <p:childTnLst>
+                  <p:par>
+                    <p:cTn id="3" fill="hold">
+                      <p:stCondLst>
+                        <p:cond delay="indefinite"/>
+                      </p:stCondLst>
+                      <p:childTnLst>
+                        <p:par>
+                          <p:cTn id="4" fill="hold">
+                            <p:stCondLst>
+                              <p:cond delay="0"/>
+                            </p:stCondLst>
+                            <p:childTnLst>
+                              <p:par>
+                                <p:cTn id="5" presetID="1" presetClass="entr" presetSubtype="0" fill="hold" grpId="0" nodeType="clickEffect">
+                                  <p:stCondLst>
+                                    <p:cond delay="0"/>
+                                  </p:stCondLst>
+                                  <p:childTnLst>
+                                    <p:set>
+                                      <p:cBhvr>
+                                        <p:cTn id="6" dur="1" fill="hold">
+                                          <p:stCondLst>
+                                            <p:cond delay="0"/>
+                                          </p:stCondLst>
+                                        </p:cTn>
+                                        <p:tgtEl>
+                                          <p:spTgt spid="10"/>
+                                        </p:tgtEl>
+                                        <p:attrNameLst>
+                                          <p:attrName>style.visibility</p:attrName>
+                                        </p:attrNameLst>
+                                      </p:cBhvr>
+                                      <p:to>
+                                        <p:strVal val="visible"/>
+                                      </p:to>
+                                    </p:set>
+                                  </p:childTnLst>
+                                </p:cTn>
+                              </p:par>
+                            </p:childTnLst>
+                          </p:cTn>
+                        </p:par>
+                      </p:childTnLst>
+                    </p:cTn>
+                  </p:par>
+                </p:childTnLst>
+              </p:cTn>
+              <p:prevCondLst>
+                <p:cond evt="onPrev" delay="0">
+                  <p:tgtEl>
+                    <p:sldTgt/>
+                  </p:tgtEl>
+                </p:cond>
+              </p:prevCondLst>
+              <p:nextCondLst>
+                <p:cond evt="onNext" delay="0">
+                  <p:tgtEl>
+                    <p:sldTgt/>
+                  </p:tgtEl>
+                </p:cond>
+              </p:nextCondLst>
+            </p:seq>
+          </p:childTnLst>
+        </p:cTn>
+      </p:par>
+    </p:tnLst>
+    <p:bldLst>
+      <p:bldP spid="10" grpId="0" animBg="1"/>
+    </p:bldLst>
+  </p:timing>
 </p:sld>
 </file>
 
@@ -35108,6 +35640,15 @@
 </file>
 
 <file path=customXml/item1.xml><?xml version="1.0" encoding="utf-8"?>
+<?mso-contentType ?>
+<FormTemplates xmlns="http://schemas.microsoft.com/sharepoint/v3/contenttype/forms">
+  <Display>DocumentLibraryForm</Display>
+  <Edit>DocumentLibraryForm</Edit>
+  <New>DocumentLibraryForm</New>
+</FormTemplates>
+</file>
+
+<file path=customXml/item2.xml><?xml version="1.0" encoding="utf-8"?>
 <p:properties xmlns:p="http://schemas.microsoft.com/office/2006/metadata/properties" xmlns:xsi="http://www.w3.org/2001/XMLSchema-instance" xmlns:pc="http://schemas.microsoft.com/office/infopath/2007/PartnerControls">
   <documentManagement>
     <TaxCatchAll xmlns="d524e8e6-9967-4aee-9f44-a119181d2657" xsi:nil="true"/>
@@ -35116,15 +35657,6 @@
     </lcf76f155ced4ddcb4097134ff3c332f>
   </documentManagement>
 </p:properties>
-</file>
-
-<file path=customXml/item2.xml><?xml version="1.0" encoding="utf-8"?>
-<?mso-contentType ?>
-<FormTemplates xmlns="http://schemas.microsoft.com/sharepoint/v3/contenttype/forms">
-  <Display>DocumentLibraryForm</Display>
-  <Edit>DocumentLibraryForm</Edit>
-  <New>DocumentLibraryForm</New>
-</FormTemplates>
 </file>
 
 <file path=customXml/item3.xml><?xml version="1.0" encoding="utf-8"?>
@@ -35370,20 +35902,20 @@
 </file>
 
 <file path=customXml/itemProps1.xml><?xml version="1.0" encoding="utf-8"?>
+<ds:datastoreItem xmlns:ds="http://schemas.openxmlformats.org/officeDocument/2006/customXml" ds:itemID="{B72CECC3-7DC2-48A3-A34C-CF77ADEDD298}">
+  <ds:schemaRefs>
+    <ds:schemaRef ds:uri="http://schemas.microsoft.com/sharepoint/v3/contenttype/forms"/>
+  </ds:schemaRefs>
+</ds:datastoreItem>
+</file>
+
+<file path=customXml/itemProps2.xml><?xml version="1.0" encoding="utf-8"?>
 <ds:datastoreItem xmlns:ds="http://schemas.openxmlformats.org/officeDocument/2006/customXml" ds:itemID="{70FF6FBF-B4F4-49AD-A88B-091F94ABFAFA}">
   <ds:schemaRefs>
     <ds:schemaRef ds:uri="http://schemas.microsoft.com/office/2006/metadata/properties"/>
     <ds:schemaRef ds:uri="http://schemas.microsoft.com/office/infopath/2007/PartnerControls"/>
     <ds:schemaRef ds:uri="d524e8e6-9967-4aee-9f44-a119181d2657"/>
     <ds:schemaRef ds:uri="6f35d0f1-6b87-42ba-ba3e-91c0d4d98947"/>
-  </ds:schemaRefs>
-</ds:datastoreItem>
-</file>
-
-<file path=customXml/itemProps2.xml><?xml version="1.0" encoding="utf-8"?>
-<ds:datastoreItem xmlns:ds="http://schemas.openxmlformats.org/officeDocument/2006/customXml" ds:itemID="{B72CECC3-7DC2-48A3-A34C-CF77ADEDD298}">
-  <ds:schemaRefs>
-    <ds:schemaRef ds:uri="http://schemas.microsoft.com/sharepoint/v3/contenttype/forms"/>
   </ds:schemaRefs>
 </ds:datastoreItem>
 </file>

</xml_diff>